<commit_message>
change on ppt and update metrics reference
</commit_message>
<xml_diff>
--- a/Deep diving plots.pptx
+++ b/Deep diving plots.pptx
@@ -161,6 +161,45 @@
   </mc:AlternateContent>
   <c:chart>
     <c:title>
+      <c:tx>
+        <c:rich>
+          <a:bodyPr rot="0" spcFirstLastPara="1" vertOverflow="ellipsis" vert="horz" wrap="square" anchor="ctr" anchorCtr="1"/>
+          <a:lstStyle/>
+          <a:p>
+            <a:pPr>
+              <a:defRPr lang="en-US" altLang="zh-CN" sz="1100" b="0" i="0" u="none" strike="noStrike" kern="1200" spc="0" baseline="0">
+                <a:solidFill>
+                  <a:schemeClr val="tx2"/>
+                </a:solidFill>
+                <a:latin typeface="ITC Officina Sans Std Book" panose="020B0506040203020204" pitchFamily="34" charset="0"/>
+                <a:ea typeface="+mn-ea"/>
+                <a:cs typeface="+mn-cs"/>
+              </a:defRPr>
+            </a:pPr>
+            <a:r>
+              <a:rPr lang="en-US" altLang="zh-CN" sz="1100" dirty="0">
+                <a:effectLst/>
+              </a:rPr>
+              <a:t>4</a:t>
+            </a:r>
+            <a:r>
+              <a:rPr lang="en-US" altLang="zh-CN" sz="1100" baseline="30000" dirty="0">
+                <a:effectLst/>
+              </a:rPr>
+              <a:t>th</a:t>
+            </a:r>
+            <a:r>
+              <a:rPr lang="en-US" altLang="zh-CN" sz="1100" dirty="0">
+                <a:effectLst/>
+              </a:rPr>
+              <a:t> grade math Proficiency and above</a:t>
+            </a:r>
+            <a:endParaRPr lang="zh-CN" altLang="zh-CN" sz="1100" dirty="0">
+              <a:effectLst/>
+            </a:endParaRPr>
+          </a:p>
+        </c:rich>
+      </c:tx>
       <c:overlay val="0"/>
       <c:spPr>
         <a:noFill/>
@@ -174,7 +213,7 @@
         <a:lstStyle/>
         <a:p>
           <a:pPr>
-            <a:defRPr lang="en-US" altLang="zh-CN" sz="1200" b="0" i="0" u="none" strike="noStrike" kern="1200" spc="0" baseline="0">
+            <a:defRPr lang="en-US" altLang="zh-CN" sz="1100" b="0" i="0" u="none" strike="noStrike" kern="1200" spc="0" baseline="0">
               <a:solidFill>
                 <a:schemeClr val="tx2"/>
               </a:solidFill>
@@ -7827,6 +7866,43 @@
   </mc:AlternateContent>
   <c:chart>
     <c:title>
+      <c:tx>
+        <c:rich>
+          <a:bodyPr rot="0" spcFirstLastPara="1" vertOverflow="ellipsis" vert="horz" wrap="square" anchor="ctr" anchorCtr="1"/>
+          <a:lstStyle/>
+          <a:p>
+            <a:pPr>
+              <a:defRPr lang="en-US" altLang="zh-CN" sz="1200" b="0" i="0" u="none" strike="noStrike" kern="1200" spc="0" baseline="0">
+                <a:solidFill>
+                  <a:schemeClr val="tx2"/>
+                </a:solidFill>
+                <a:latin typeface="ITC Officina Sans Std Book" panose="020B0506040203020204" pitchFamily="34" charset="0"/>
+                <a:ea typeface="+mn-ea"/>
+                <a:cs typeface="+mn-cs"/>
+              </a:defRPr>
+            </a:pPr>
+            <a:r>
+              <a:rPr lang="en-US" altLang="zh-CN" sz="1200" b="0" i="0" u="none" strike="noStrike" baseline="0" dirty="0">
+                <a:effectLst/>
+              </a:rPr>
+              <a:t>8</a:t>
+            </a:r>
+            <a:r>
+              <a:rPr lang="en-US" altLang="zh-CN" sz="1200" b="0" i="0" u="none" strike="noStrike" baseline="30000" dirty="0">
+                <a:effectLst/>
+              </a:rPr>
+              <a:t>th</a:t>
+            </a:r>
+            <a:r>
+              <a:rPr lang="en-US" altLang="zh-CN" sz="1200" b="0" i="0" u="none" strike="noStrike" baseline="0" dirty="0">
+                <a:effectLst/>
+              </a:rPr>
+              <a:t> grade math Proficiency and above</a:t>
+            </a:r>
+            <a:endParaRPr lang="en-US" altLang="zh-CN" dirty="0"/>
+          </a:p>
+        </c:rich>
+      </c:tx>
       <c:overlay val="0"/>
       <c:spPr>
         <a:noFill/>
@@ -12755,6 +12831,43 @@
   </mc:AlternateContent>
   <c:chart>
     <c:title>
+      <c:tx>
+        <c:rich>
+          <a:bodyPr rot="0" spcFirstLastPara="1" vertOverflow="ellipsis" vert="horz" wrap="square" anchor="ctr" anchorCtr="1"/>
+          <a:lstStyle/>
+          <a:p>
+            <a:pPr>
+              <a:defRPr lang="en-US" altLang="zh-CN" sz="1200" b="0" i="0" u="none" strike="noStrike" kern="1200" spc="0" baseline="0">
+                <a:solidFill>
+                  <a:schemeClr val="tx2"/>
+                </a:solidFill>
+                <a:latin typeface="ITC Officina Sans Std Book" panose="020B0506040203020204" pitchFamily="34" charset="0"/>
+                <a:ea typeface="+mn-ea"/>
+                <a:cs typeface="+mn-cs"/>
+              </a:defRPr>
+            </a:pPr>
+            <a:r>
+              <a:rPr lang="en-US" altLang="zh-CN" sz="1200" b="0" i="0" u="none" strike="noStrike" baseline="0" dirty="0">
+                <a:effectLst/>
+              </a:rPr>
+              <a:t>8</a:t>
+            </a:r>
+            <a:r>
+              <a:rPr lang="en-US" altLang="zh-CN" sz="1200" b="0" i="0" u="none" strike="noStrike" baseline="30000" dirty="0">
+                <a:effectLst/>
+              </a:rPr>
+              <a:t>th</a:t>
+            </a:r>
+            <a:r>
+              <a:rPr lang="en-US" altLang="zh-CN" sz="1200" b="0" i="0" u="none" strike="noStrike" baseline="0" dirty="0">
+                <a:effectLst/>
+              </a:rPr>
+              <a:t> grade passing algebra</a:t>
+            </a:r>
+            <a:endParaRPr lang="en-US" altLang="zh-CN" dirty="0"/>
+          </a:p>
+        </c:rich>
+      </c:tx>
       <c:overlay val="0"/>
       <c:spPr>
         <a:noFill/>
@@ -12888,10 +13001,10 @@
                 <c:formatCode>0.00%</c:formatCode>
                 <c:ptCount val="2"/>
                 <c:pt idx="0">
-                  <c:v>0.11550767918088738</c:v>
+                  <c:v>0.95166959578207377</c:v>
                 </c:pt>
                 <c:pt idx="1">
-                  <c:v>0.10605110732538331</c:v>
+                  <c:v>0.67128191856452724</c:v>
                 </c:pt>
               </c:numCache>
             </c:numRef>
@@ -13002,10 +13115,10 @@
                 <c:formatCode>0.00%</c:formatCode>
                 <c:ptCount val="2"/>
                 <c:pt idx="0">
-                  <c:v>0.21992</c:v>
+                  <c:v>0.98956083513318938</c:v>
                 </c:pt>
                 <c:pt idx="1">
-                  <c:v>7.8091324200913248E-2</c:v>
+                  <c:v>0.40988399961652766</c:v>
                 </c:pt>
               </c:numCache>
             </c:numRef>
@@ -13116,10 +13229,10 @@
                 <c:formatCode>0.00%</c:formatCode>
                 <c:ptCount val="2"/>
                 <c:pt idx="0">
-                  <c:v>0.49961028838659394</c:v>
+                  <c:v>0.99688958009331263</c:v>
                 </c:pt>
                 <c:pt idx="1">
-                  <c:v>0.2124835103409726</c:v>
+                  <c:v>0.71286209631898045</c:v>
                 </c:pt>
               </c:numCache>
             </c:numRef>
@@ -13230,10 +13343,10 @@
                 <c:formatCode>0.00%</c:formatCode>
                 <c:ptCount val="2"/>
                 <c:pt idx="0">
-                  <c:v>0.53470185728250241</c:v>
+                  <c:v>1</c:v>
                 </c:pt>
                 <c:pt idx="1">
-                  <c:v>0.24215270935960592</c:v>
+                  <c:v>0.61538557836755137</c:v>
                 </c:pt>
               </c:numCache>
             </c:numRef>
@@ -13451,6 +13564,43 @@
   </mc:AlternateContent>
   <c:chart>
     <c:title>
+      <c:tx>
+        <c:rich>
+          <a:bodyPr rot="0" spcFirstLastPara="1" vertOverflow="ellipsis" vert="horz" wrap="square" anchor="ctr" anchorCtr="1"/>
+          <a:lstStyle/>
+          <a:p>
+            <a:pPr>
+              <a:defRPr lang="en-US" altLang="zh-CN" sz="1200" b="0" i="0" u="none" strike="noStrike" kern="1200" spc="0" baseline="0">
+                <a:solidFill>
+                  <a:schemeClr val="tx2"/>
+                </a:solidFill>
+                <a:latin typeface="ITC Officina Sans Std Book" panose="020B0506040203020204" pitchFamily="34" charset="0"/>
+                <a:ea typeface="+mn-ea"/>
+                <a:cs typeface="+mn-cs"/>
+              </a:defRPr>
+            </a:pPr>
+            <a:r>
+              <a:rPr lang="en-US" altLang="zh-CN" sz="1200" b="0" i="0" u="none" strike="noStrike" baseline="0" dirty="0">
+                <a:effectLst/>
+              </a:rPr>
+              <a:t>4</a:t>
+            </a:r>
+            <a:r>
+              <a:rPr lang="en-US" altLang="zh-CN" sz="1200" b="0" i="0" u="none" strike="noStrike" baseline="30000" dirty="0">
+                <a:effectLst/>
+              </a:rPr>
+              <a:t>th</a:t>
+            </a:r>
+            <a:r>
+              <a:rPr lang="en-US" altLang="zh-CN" sz="1200" b="0" i="0" u="none" strike="noStrike" baseline="0" dirty="0">
+                <a:effectLst/>
+              </a:rPr>
+              <a:t> grade Math Advanced</a:t>
+            </a:r>
+            <a:endParaRPr lang="en-US" altLang="zh-CN" dirty="0"/>
+          </a:p>
+        </c:rich>
+      </c:tx>
       <c:overlay val="0"/>
       <c:spPr>
         <a:noFill/>
@@ -13508,6 +13658,61 @@
             <a:effectLst/>
           </c:spPr>
           <c:invertIfNegative val="0"/>
+          <c:dLbls>
+            <c:spPr>
+              <a:noFill/>
+              <a:ln>
+                <a:noFill/>
+              </a:ln>
+              <a:effectLst/>
+            </c:spPr>
+            <c:txPr>
+              <a:bodyPr rot="0" spcFirstLastPara="1" vertOverflow="ellipsis" vert="horz" wrap="square" lIns="38100" tIns="19050" rIns="38100" bIns="19050" anchor="ctr" anchorCtr="1">
+                <a:spAutoFit/>
+              </a:bodyPr>
+              <a:lstStyle/>
+              <a:p>
+                <a:pPr>
+                  <a:defRPr lang="en-US" altLang="zh-CN" sz="1000" b="0" i="0" u="none" strike="noStrike" kern="1200" baseline="0">
+                    <a:solidFill>
+                      <a:schemeClr val="tx2"/>
+                    </a:solidFill>
+                    <a:latin typeface="ITC Officina Sans Std Book" panose="020B0506040203020204" pitchFamily="34" charset="0"/>
+                    <a:ea typeface="+mn-ea"/>
+                    <a:cs typeface="+mn-cs"/>
+                  </a:defRPr>
+                </a:pPr>
+                <a:endParaRPr lang="zh-CN"/>
+              </a:p>
+            </c:txPr>
+            <c:dLblPos val="outEnd"/>
+            <c:showLegendKey val="0"/>
+            <c:showVal val="1"/>
+            <c:showCatName val="0"/>
+            <c:showSerName val="0"/>
+            <c:showPercent val="0"/>
+            <c:showBubbleSize val="0"/>
+            <c:showLeaderLines val="0"/>
+            <c:extLst>
+              <c:ext xmlns:c15="http://schemas.microsoft.com/office/drawing/2012/chart" uri="{CE6537A1-D6FC-4f65-9D91-7224C49458BB}">
+                <c15:showLeaderLines val="1"/>
+                <c15:leaderLines>
+                  <c:spPr>
+                    <a:ln w="9525" cap="flat" cmpd="sng" algn="ctr">
+                      <a:solidFill>
+                        <a:schemeClr val="tx1">
+                          <a:lumMod val="35000"/>
+                          <a:lumOff val="65000"/>
+                        </a:schemeClr>
+                      </a:solidFill>
+                      <a:round/>
+                    </a:ln>
+                    <a:effectLst/>
+                  </c:spPr>
+                </c15:leaderLines>
+              </c:ext>
+            </c:extLst>
+          </c:dLbls>
           <c:cat>
             <c:strRef>
               <c:f>Sheet1!$A$2:$A$3</c:f>
@@ -13567,6 +13772,61 @@
             <a:effectLst/>
           </c:spPr>
           <c:invertIfNegative val="0"/>
+          <c:dLbls>
+            <c:spPr>
+              <a:noFill/>
+              <a:ln>
+                <a:noFill/>
+              </a:ln>
+              <a:effectLst/>
+            </c:spPr>
+            <c:txPr>
+              <a:bodyPr rot="0" spcFirstLastPara="1" vertOverflow="ellipsis" vert="horz" wrap="square" lIns="38100" tIns="19050" rIns="38100" bIns="19050" anchor="ctr" anchorCtr="1">
+                <a:spAutoFit/>
+              </a:bodyPr>
+              <a:lstStyle/>
+              <a:p>
+                <a:pPr>
+                  <a:defRPr lang="en-US" altLang="zh-CN" sz="1000" b="0" i="0" u="none" strike="noStrike" kern="1200" baseline="0">
+                    <a:solidFill>
+                      <a:schemeClr val="tx2"/>
+                    </a:solidFill>
+                    <a:latin typeface="ITC Officina Sans Std Book" panose="020B0506040203020204" pitchFamily="34" charset="0"/>
+                    <a:ea typeface="+mn-ea"/>
+                    <a:cs typeface="+mn-cs"/>
+                  </a:defRPr>
+                </a:pPr>
+                <a:endParaRPr lang="zh-CN"/>
+              </a:p>
+            </c:txPr>
+            <c:dLblPos val="outEnd"/>
+            <c:showLegendKey val="0"/>
+            <c:showVal val="1"/>
+            <c:showCatName val="0"/>
+            <c:showSerName val="0"/>
+            <c:showPercent val="0"/>
+            <c:showBubbleSize val="0"/>
+            <c:showLeaderLines val="0"/>
+            <c:extLst>
+              <c:ext xmlns:c15="http://schemas.microsoft.com/office/drawing/2012/chart" uri="{CE6537A1-D6FC-4f65-9D91-7224C49458BB}">
+                <c15:showLeaderLines val="1"/>
+                <c15:leaderLines>
+                  <c:spPr>
+                    <a:ln w="9525" cap="flat" cmpd="sng" algn="ctr">
+                      <a:solidFill>
+                        <a:schemeClr val="tx1">
+                          <a:lumMod val="35000"/>
+                          <a:lumOff val="65000"/>
+                        </a:schemeClr>
+                      </a:solidFill>
+                      <a:round/>
+                    </a:ln>
+                    <a:effectLst/>
+                  </c:spPr>
+                </c15:leaderLines>
+              </c:ext>
+            </c:extLst>
+          </c:dLbls>
           <c:cat>
             <c:strRef>
               <c:f>Sheet1!$A$2:$A$3</c:f>
@@ -13626,6 +13886,61 @@
             <a:effectLst/>
           </c:spPr>
           <c:invertIfNegative val="0"/>
+          <c:dLbls>
+            <c:spPr>
+              <a:noFill/>
+              <a:ln>
+                <a:noFill/>
+              </a:ln>
+              <a:effectLst/>
+            </c:spPr>
+            <c:txPr>
+              <a:bodyPr rot="0" spcFirstLastPara="1" vertOverflow="ellipsis" vert="horz" wrap="square" lIns="38100" tIns="19050" rIns="38100" bIns="19050" anchor="ctr" anchorCtr="1">
+                <a:spAutoFit/>
+              </a:bodyPr>
+              <a:lstStyle/>
+              <a:p>
+                <a:pPr>
+                  <a:defRPr lang="en-US" altLang="zh-CN" sz="1000" b="0" i="0" u="none" strike="noStrike" kern="1200" baseline="0">
+                    <a:solidFill>
+                      <a:schemeClr val="tx2"/>
+                    </a:solidFill>
+                    <a:latin typeface="ITC Officina Sans Std Book" panose="020B0506040203020204" pitchFamily="34" charset="0"/>
+                    <a:ea typeface="+mn-ea"/>
+                    <a:cs typeface="+mn-cs"/>
+                  </a:defRPr>
+                </a:pPr>
+                <a:endParaRPr lang="zh-CN"/>
+              </a:p>
+            </c:txPr>
+            <c:dLblPos val="outEnd"/>
+            <c:showLegendKey val="0"/>
+            <c:showVal val="1"/>
+            <c:showCatName val="0"/>
+            <c:showSerName val="0"/>
+            <c:showPercent val="0"/>
+            <c:showBubbleSize val="0"/>
+            <c:showLeaderLines val="0"/>
+            <c:extLst>
+              <c:ext xmlns:c15="http://schemas.microsoft.com/office/drawing/2012/chart" uri="{CE6537A1-D6FC-4f65-9D91-7224C49458BB}">
+                <c15:showLeaderLines val="1"/>
+                <c15:leaderLines>
+                  <c:spPr>
+                    <a:ln w="9525" cap="flat" cmpd="sng" algn="ctr">
+                      <a:solidFill>
+                        <a:schemeClr val="tx1">
+                          <a:lumMod val="35000"/>
+                          <a:lumOff val="65000"/>
+                        </a:schemeClr>
+                      </a:solidFill>
+                      <a:round/>
+                    </a:ln>
+                    <a:effectLst/>
+                  </c:spPr>
+                </c15:leaderLines>
+              </c:ext>
+            </c:extLst>
+          </c:dLbls>
           <c:cat>
             <c:strRef>
               <c:f>Sheet1!$A$2:$A$3</c:f>
@@ -13685,6 +14000,61 @@
             <a:effectLst/>
           </c:spPr>
           <c:invertIfNegative val="0"/>
+          <c:dLbls>
+            <c:spPr>
+              <a:noFill/>
+              <a:ln>
+                <a:noFill/>
+              </a:ln>
+              <a:effectLst/>
+            </c:spPr>
+            <c:txPr>
+              <a:bodyPr rot="0" spcFirstLastPara="1" vertOverflow="ellipsis" vert="horz" wrap="square" lIns="38100" tIns="19050" rIns="38100" bIns="19050" anchor="ctr" anchorCtr="1">
+                <a:spAutoFit/>
+              </a:bodyPr>
+              <a:lstStyle/>
+              <a:p>
+                <a:pPr>
+                  <a:defRPr lang="en-US" altLang="zh-CN" sz="1000" b="0" i="0" u="none" strike="noStrike" kern="1200" baseline="0">
+                    <a:solidFill>
+                      <a:schemeClr val="tx2"/>
+                    </a:solidFill>
+                    <a:latin typeface="ITC Officina Sans Std Book" panose="020B0506040203020204" pitchFamily="34" charset="0"/>
+                    <a:ea typeface="+mn-ea"/>
+                    <a:cs typeface="+mn-cs"/>
+                  </a:defRPr>
+                </a:pPr>
+                <a:endParaRPr lang="zh-CN"/>
+              </a:p>
+            </c:txPr>
+            <c:dLblPos val="outEnd"/>
+            <c:showLegendKey val="0"/>
+            <c:showVal val="1"/>
+            <c:showCatName val="0"/>
+            <c:showSerName val="0"/>
+            <c:showPercent val="0"/>
+            <c:showBubbleSize val="0"/>
+            <c:showLeaderLines val="0"/>
+            <c:extLst>
+              <c:ext xmlns:c15="http://schemas.microsoft.com/office/drawing/2012/chart" uri="{CE6537A1-D6FC-4f65-9D91-7224C49458BB}">
+                <c15:showLeaderLines val="1"/>
+                <c15:leaderLines>
+                  <c:spPr>
+                    <a:ln w="9525" cap="flat" cmpd="sng" algn="ctr">
+                      <a:solidFill>
+                        <a:schemeClr val="tx1">
+                          <a:lumMod val="35000"/>
+                          <a:lumOff val="65000"/>
+                        </a:schemeClr>
+                      </a:solidFill>
+                      <a:round/>
+                    </a:ln>
+                    <a:effectLst/>
+                  </c:spPr>
+                </c15:leaderLines>
+              </c:ext>
+            </c:extLst>
+          </c:dLbls>
           <c:cat>
             <c:strRef>
               <c:f>Sheet1!$A$2:$A$3</c:f>
@@ -13721,8 +14091,9 @@
           </c:extLst>
         </c:ser>
         <c:dLbls>
+          <c:dLblPos val="outEnd"/>
           <c:showLegendKey val="0"/>
-          <c:showVal val="0"/>
+          <c:showVal val="1"/>
           <c:showCatName val="0"/>
           <c:showSerName val="0"/>
           <c:showPercent val="0"/>
@@ -13926,6 +14297,43 @@
   </mc:AlternateContent>
   <c:chart>
     <c:title>
+      <c:tx>
+        <c:rich>
+          <a:bodyPr rot="0" spcFirstLastPara="1" vertOverflow="ellipsis" vert="horz" wrap="square" anchor="ctr" anchorCtr="1"/>
+          <a:lstStyle/>
+          <a:p>
+            <a:pPr>
+              <a:defRPr lang="en-US" altLang="zh-CN" sz="1200" b="0" i="0" u="none" strike="noStrike" kern="1200" spc="0" baseline="0">
+                <a:solidFill>
+                  <a:schemeClr val="tx2"/>
+                </a:solidFill>
+                <a:latin typeface="ITC Officina Sans Std Book" panose="020B0506040203020204" pitchFamily="34" charset="0"/>
+                <a:ea typeface="+mn-ea"/>
+                <a:cs typeface="+mn-cs"/>
+              </a:defRPr>
+            </a:pPr>
+            <a:r>
+              <a:rPr lang="en-US" altLang="zh-CN" sz="1200" b="0" i="0" u="none" strike="noStrike" baseline="0" dirty="0">
+                <a:effectLst/>
+              </a:rPr>
+              <a:t>8</a:t>
+            </a:r>
+            <a:r>
+              <a:rPr lang="en-US" altLang="zh-CN" sz="1200" b="0" i="0" u="none" strike="noStrike" baseline="30000" dirty="0">
+                <a:effectLst/>
+              </a:rPr>
+              <a:t>th</a:t>
+            </a:r>
+            <a:r>
+              <a:rPr lang="en-US" altLang="zh-CN" sz="1200" b="0" i="0" u="none" strike="noStrike" baseline="0" dirty="0">
+                <a:effectLst/>
+              </a:rPr>
+              <a:t> grade Math Advanced </a:t>
+            </a:r>
+            <a:endParaRPr lang="en-US" altLang="zh-CN" dirty="0"/>
+          </a:p>
+        </c:rich>
+      </c:tx>
       <c:overlay val="0"/>
       <c:spPr>
         <a:noFill/>
@@ -14622,6 +15030,31 @@
   </mc:AlternateContent>
   <c:chart>
     <c:title>
+      <c:tx>
+        <c:rich>
+          <a:bodyPr rot="0" spcFirstLastPara="1" vertOverflow="ellipsis" vert="horz" wrap="square" anchor="ctr" anchorCtr="1"/>
+          <a:lstStyle/>
+          <a:p>
+            <a:pPr>
+              <a:defRPr lang="en-US" altLang="zh-CN" sz="1200" b="0" i="0" u="none" strike="noStrike" kern="1200" spc="0" baseline="0">
+                <a:solidFill>
+                  <a:schemeClr val="tx2"/>
+                </a:solidFill>
+                <a:latin typeface="ITC Officina Sans Std Book" panose="020B0506040203020204" pitchFamily="34" charset="0"/>
+                <a:ea typeface="+mn-ea"/>
+                <a:cs typeface="+mn-cs"/>
+              </a:defRPr>
+            </a:pPr>
+            <a:r>
+              <a:rPr lang="en-US" altLang="zh-CN" sz="1200" b="0" i="0" u="none" strike="noStrike" baseline="0" dirty="0">
+                <a:effectLst/>
+              </a:rPr>
+              <a:t>CPS K-8 STEM Magnet School Enrollment </a:t>
+            </a:r>
+            <a:endParaRPr lang="en-US" altLang="zh-CN" dirty="0"/>
+          </a:p>
+        </c:rich>
+      </c:tx>
       <c:overlay val="0"/>
       <c:spPr>
         <a:noFill/>
@@ -15294,6 +15727,43 @@
   </mc:AlternateContent>
   <c:chart>
     <c:title>
+      <c:tx>
+        <c:rich>
+          <a:bodyPr rot="0" spcFirstLastPara="1" vertOverflow="ellipsis" vert="horz" wrap="square" anchor="ctr" anchorCtr="1"/>
+          <a:lstStyle/>
+          <a:p>
+            <a:pPr>
+              <a:defRPr lang="en-US" altLang="zh-CN" sz="1200" b="0" i="0" u="none" strike="noStrike" kern="1200" spc="0" baseline="0">
+                <a:solidFill>
+                  <a:schemeClr val="tx2"/>
+                </a:solidFill>
+                <a:latin typeface="ITC Officina Sans Std Book" panose="020B0506040203020204" pitchFamily="34" charset="0"/>
+                <a:ea typeface="+mn-ea"/>
+                <a:cs typeface="+mn-cs"/>
+              </a:defRPr>
+            </a:pPr>
+            <a:r>
+              <a:rPr lang="sv-SE" altLang="zh-CN" sz="1200" b="0" i="0" u="none" strike="noStrike" baseline="0" dirty="0">
+                <a:effectLst/>
+              </a:rPr>
+              <a:t>8</a:t>
+            </a:r>
+            <a:r>
+              <a:rPr lang="sv-SE" altLang="zh-CN" sz="1200" b="0" i="0" u="none" strike="noStrike" baseline="30000" dirty="0">
+                <a:effectLst/>
+              </a:rPr>
+              <a:t>th</a:t>
+            </a:r>
+            <a:r>
+              <a:rPr lang="sv-SE" altLang="zh-CN" sz="1200" b="0" i="0" u="none" strike="noStrike" baseline="0" dirty="0">
+                <a:effectLst/>
+              </a:rPr>
+              <a:t> grade algebra 1 enrollment</a:t>
+            </a:r>
+            <a:endParaRPr lang="en-US" altLang="zh-CN" dirty="0"/>
+          </a:p>
+        </c:rich>
+      </c:tx>
       <c:overlay val="0"/>
       <c:spPr>
         <a:noFill/>
@@ -15990,6 +16460,31 @@
   </mc:AlternateContent>
   <c:chart>
     <c:title>
+      <c:tx>
+        <c:rich>
+          <a:bodyPr rot="0" spcFirstLastPara="1" vertOverflow="ellipsis" vert="horz" wrap="square" anchor="ctr" anchorCtr="1"/>
+          <a:lstStyle/>
+          <a:p>
+            <a:pPr>
+              <a:defRPr lang="en-US" altLang="zh-CN" sz="1200" b="0" i="0" u="none" strike="noStrike" kern="1200" spc="0" baseline="0">
+                <a:solidFill>
+                  <a:schemeClr val="tx2"/>
+                </a:solidFill>
+                <a:latin typeface="ITC Officina Sans Std Book" panose="020B0506040203020204" pitchFamily="34" charset="0"/>
+                <a:ea typeface="+mn-ea"/>
+                <a:cs typeface="+mn-cs"/>
+              </a:defRPr>
+            </a:pPr>
+            <a:r>
+              <a:rPr lang="en-US" altLang="zh-CN" sz="1200" b="0" i="0" u="none" strike="noStrike" baseline="0" dirty="0">
+                <a:effectLst/>
+              </a:rPr>
+              <a:t>Lack of Household Internet Access</a:t>
+            </a:r>
+            <a:endParaRPr lang="en-US" altLang="zh-CN" dirty="0"/>
+          </a:p>
+        </c:rich>
+      </c:tx>
       <c:overlay val="0"/>
       <c:spPr>
         <a:noFill/>
@@ -16686,6 +17181,31 @@
   </mc:AlternateContent>
   <c:chart>
     <c:title>
+      <c:tx>
+        <c:rich>
+          <a:bodyPr rot="0" spcFirstLastPara="1" vertOverflow="ellipsis" vert="horz" wrap="square" anchor="ctr" anchorCtr="1"/>
+          <a:lstStyle/>
+          <a:p>
+            <a:pPr>
+              <a:defRPr lang="en-US" altLang="zh-CN" sz="1200" b="0" i="0" u="none" strike="noStrike" kern="1200" spc="0" baseline="0">
+                <a:solidFill>
+                  <a:schemeClr val="tx2"/>
+                </a:solidFill>
+                <a:latin typeface="ITC Officina Sans Std Book" panose="020B0506040203020204" pitchFamily="34" charset="0"/>
+                <a:ea typeface="+mn-ea"/>
+                <a:cs typeface="+mn-cs"/>
+              </a:defRPr>
+            </a:pPr>
+            <a:r>
+              <a:rPr lang="en-US" altLang="zh-CN" sz="1200" b="0" i="0" u="none" strike="noStrike" baseline="0" dirty="0">
+                <a:effectLst/>
+              </a:rPr>
+              <a:t>HS SAT Math Proficiency and Above </a:t>
+            </a:r>
+            <a:endParaRPr lang="en-US" altLang="zh-CN" dirty="0"/>
+          </a:p>
+        </c:rich>
+      </c:tx>
       <c:overlay val="0"/>
       <c:spPr>
         <a:noFill/>
@@ -31656,6 +32176,295 @@
 </file>
 
 <file path=ppt/slideLayouts/slideLayout10.xml><?xml version="1.0" encoding="utf-8"?>
+<p:sldLayout xmlns:a="http://schemas.openxmlformats.org/drawingml/2006/main" xmlns:r="http://schemas.openxmlformats.org/officeDocument/2006/relationships" xmlns:p="http://schemas.openxmlformats.org/presentationml/2006/main" type="picTx" preserve="1">
+  <p:cSld name="Picture with Caption">
+    <p:spTree>
+      <p:nvGrpSpPr>
+        <p:cNvPr id="1" name=""/>
+        <p:cNvGrpSpPr/>
+        <p:nvPr/>
+      </p:nvGrpSpPr>
+      <p:grpSpPr>
+        <a:xfrm>
+          <a:off x="0" y="0"/>
+          <a:ext cx="0" cy="0"/>
+          <a:chOff x="0" y="0"/>
+          <a:chExt cx="0" cy="0"/>
+        </a:xfrm>
+      </p:grpSpPr>
+      <p:sp>
+        <p:nvSpPr>
+          <p:cNvPr id="2" name="Title 1">
+            <a:extLst>
+              <a:ext uri="{FF2B5EF4-FFF2-40B4-BE49-F238E27FC236}">
+                <a16:creationId xmlns:a16="http://schemas.microsoft.com/office/drawing/2014/main" id="{57FD32A1-CC95-46CB-B899-347D739EF1CD}"/>
+              </a:ext>
+            </a:extLst>
+          </p:cNvPr>
+          <p:cNvSpPr>
+            <a:spLocks noGrp="1"/>
+          </p:cNvSpPr>
+          <p:nvPr>
+            <p:ph type="title"/>
+          </p:nvPr>
+        </p:nvSpPr>
+        <p:spPr>
+          <a:xfrm>
+            <a:off x="839788" y="457200"/>
+            <a:ext cx="3932237" cy="1600200"/>
+          </a:xfrm>
+        </p:spPr>
+        <p:txBody>
+          <a:bodyPr anchor="b"/>
+          <a:lstStyle>
+            <a:lvl1pPr>
+              <a:defRPr sz="3200"/>
+            </a:lvl1pPr>
+          </a:lstStyle>
+          <a:p>
+            <a:r>
+              <a:rPr lang="en-US" altLang="zh-CN"/>
+              <a:t>Click to edit Master title style</a:t>
+            </a:r>
+            <a:endParaRPr lang="zh-CN" altLang="en-US"/>
+          </a:p>
+        </p:txBody>
+      </p:sp>
+      <p:sp>
+        <p:nvSpPr>
+          <p:cNvPr id="3" name="Picture Placeholder 2">
+            <a:extLst>
+              <a:ext uri="{FF2B5EF4-FFF2-40B4-BE49-F238E27FC236}">
+                <a16:creationId xmlns:a16="http://schemas.microsoft.com/office/drawing/2014/main" id="{B20C850C-7709-4E7D-B370-015508CA209F}"/>
+              </a:ext>
+            </a:extLst>
+          </p:cNvPr>
+          <p:cNvSpPr>
+            <a:spLocks noGrp="1"/>
+          </p:cNvSpPr>
+          <p:nvPr>
+            <p:ph type="pic" idx="1"/>
+          </p:nvPr>
+        </p:nvSpPr>
+        <p:spPr>
+          <a:xfrm>
+            <a:off x="5183188" y="987425"/>
+            <a:ext cx="6172200" cy="4873625"/>
+          </a:xfrm>
+        </p:spPr>
+        <p:txBody>
+          <a:bodyPr/>
+          <a:lstStyle>
+            <a:lvl1pPr marL="0" indent="0">
+              <a:buNone/>
+              <a:defRPr sz="3200"/>
+            </a:lvl1pPr>
+            <a:lvl2pPr marL="457200" indent="0">
+              <a:buNone/>
+              <a:defRPr sz="2800"/>
+            </a:lvl2pPr>
+            <a:lvl3pPr marL="914400" indent="0">
+              <a:buNone/>
+              <a:defRPr sz="2400"/>
+            </a:lvl3pPr>
+            <a:lvl4pPr marL="1371600" indent="0">
+              <a:buNone/>
+              <a:defRPr sz="2000"/>
+            </a:lvl4pPr>
+            <a:lvl5pPr marL="1828800" indent="0">
+              <a:buNone/>
+              <a:defRPr sz="2000"/>
+            </a:lvl5pPr>
+            <a:lvl6pPr marL="2286000" indent="0">
+              <a:buNone/>
+              <a:defRPr sz="2000"/>
+            </a:lvl6pPr>
+            <a:lvl7pPr marL="2743200" indent="0">
+              <a:buNone/>
+              <a:defRPr sz="2000"/>
+            </a:lvl7pPr>
+            <a:lvl8pPr marL="3200400" indent="0">
+              <a:buNone/>
+              <a:defRPr sz="2000"/>
+            </a:lvl8pPr>
+            <a:lvl9pPr marL="3657600" indent="0">
+              <a:buNone/>
+              <a:defRPr sz="2000"/>
+            </a:lvl9pPr>
+          </a:lstStyle>
+          <a:p>
+            <a:endParaRPr lang="zh-CN" altLang="en-US"/>
+          </a:p>
+        </p:txBody>
+      </p:sp>
+      <p:sp>
+        <p:nvSpPr>
+          <p:cNvPr id="4" name="Text Placeholder 3">
+            <a:extLst>
+              <a:ext uri="{FF2B5EF4-FFF2-40B4-BE49-F238E27FC236}">
+                <a16:creationId xmlns:a16="http://schemas.microsoft.com/office/drawing/2014/main" id="{964E966B-74CB-4C6C-85E4-68E9896FCDE5}"/>
+              </a:ext>
+            </a:extLst>
+          </p:cNvPr>
+          <p:cNvSpPr>
+            <a:spLocks noGrp="1"/>
+          </p:cNvSpPr>
+          <p:nvPr>
+            <p:ph type="body" sz="half" idx="2"/>
+          </p:nvPr>
+        </p:nvSpPr>
+        <p:spPr>
+          <a:xfrm>
+            <a:off x="839788" y="2057400"/>
+            <a:ext cx="3932237" cy="3811588"/>
+          </a:xfrm>
+        </p:spPr>
+        <p:txBody>
+          <a:bodyPr/>
+          <a:lstStyle>
+            <a:lvl1pPr marL="0" indent="0">
+              <a:buNone/>
+              <a:defRPr sz="1600"/>
+            </a:lvl1pPr>
+            <a:lvl2pPr marL="457200" indent="0">
+              <a:buNone/>
+              <a:defRPr sz="1400"/>
+            </a:lvl2pPr>
+            <a:lvl3pPr marL="914400" indent="0">
+              <a:buNone/>
+              <a:defRPr sz="1200"/>
+            </a:lvl3pPr>
+            <a:lvl4pPr marL="1371600" indent="0">
+              <a:buNone/>
+              <a:defRPr sz="1000"/>
+            </a:lvl4pPr>
+            <a:lvl5pPr marL="1828800" indent="0">
+              <a:buNone/>
+              <a:defRPr sz="1000"/>
+            </a:lvl5pPr>
+            <a:lvl6pPr marL="2286000" indent="0">
+              <a:buNone/>
+              <a:defRPr sz="1000"/>
+            </a:lvl6pPr>
+            <a:lvl7pPr marL="2743200" indent="0">
+              <a:buNone/>
+              <a:defRPr sz="1000"/>
+            </a:lvl7pPr>
+            <a:lvl8pPr marL="3200400" indent="0">
+              <a:buNone/>
+              <a:defRPr sz="1000"/>
+            </a:lvl8pPr>
+            <a:lvl9pPr marL="3657600" indent="0">
+              <a:buNone/>
+              <a:defRPr sz="1000"/>
+            </a:lvl9pPr>
+          </a:lstStyle>
+          <a:p>
+            <a:pPr lvl="0"/>
+            <a:r>
+              <a:rPr lang="en-US" altLang="zh-CN"/>
+              <a:t>Click to edit Master text styles</a:t>
+            </a:r>
+          </a:p>
+        </p:txBody>
+      </p:sp>
+      <p:sp>
+        <p:nvSpPr>
+          <p:cNvPr id="5" name="Date Placeholder 4">
+            <a:extLst>
+              <a:ext uri="{FF2B5EF4-FFF2-40B4-BE49-F238E27FC236}">
+                <a16:creationId xmlns:a16="http://schemas.microsoft.com/office/drawing/2014/main" id="{0240C91C-308B-4324-8091-FF3888B6A657}"/>
+              </a:ext>
+            </a:extLst>
+          </p:cNvPr>
+          <p:cNvSpPr>
+            <a:spLocks noGrp="1"/>
+          </p:cNvSpPr>
+          <p:nvPr>
+            <p:ph type="dt" sz="half" idx="10"/>
+          </p:nvPr>
+        </p:nvSpPr>
+        <p:spPr/>
+        <p:txBody>
+          <a:bodyPr/>
+          <a:lstStyle/>
+          <a:p>
+            <a:fld id="{9F89E671-33B1-43C9-86CB-BB04ADBAB0E4}" type="datetimeFigureOut">
+              <a:rPr lang="zh-CN" altLang="en-US" smtClean="0"/>
+              <a:t>2022/8/30</a:t>
+            </a:fld>
+            <a:endParaRPr lang="zh-CN" altLang="en-US"/>
+          </a:p>
+        </p:txBody>
+      </p:sp>
+      <p:sp>
+        <p:nvSpPr>
+          <p:cNvPr id="6" name="Footer Placeholder 5">
+            <a:extLst>
+              <a:ext uri="{FF2B5EF4-FFF2-40B4-BE49-F238E27FC236}">
+                <a16:creationId xmlns:a16="http://schemas.microsoft.com/office/drawing/2014/main" id="{0E41BF20-2E60-48AB-AA29-35590EA2EA77}"/>
+              </a:ext>
+            </a:extLst>
+          </p:cNvPr>
+          <p:cNvSpPr>
+            <a:spLocks noGrp="1"/>
+          </p:cNvSpPr>
+          <p:nvPr>
+            <p:ph type="ftr" sz="quarter" idx="11"/>
+          </p:nvPr>
+        </p:nvSpPr>
+        <p:spPr/>
+        <p:txBody>
+          <a:bodyPr/>
+          <a:lstStyle/>
+          <a:p>
+            <a:endParaRPr lang="zh-CN" altLang="en-US"/>
+          </a:p>
+        </p:txBody>
+      </p:sp>
+      <p:sp>
+        <p:nvSpPr>
+          <p:cNvPr id="7" name="Slide Number Placeholder 6">
+            <a:extLst>
+              <a:ext uri="{FF2B5EF4-FFF2-40B4-BE49-F238E27FC236}">
+                <a16:creationId xmlns:a16="http://schemas.microsoft.com/office/drawing/2014/main" id="{31F91B17-80EA-4DAA-8A1D-83949E7C6E0D}"/>
+              </a:ext>
+            </a:extLst>
+          </p:cNvPr>
+          <p:cNvSpPr>
+            <a:spLocks noGrp="1"/>
+          </p:cNvSpPr>
+          <p:nvPr>
+            <p:ph type="sldNum" sz="quarter" idx="12"/>
+          </p:nvPr>
+        </p:nvSpPr>
+        <p:spPr/>
+        <p:txBody>
+          <a:bodyPr/>
+          <a:lstStyle/>
+          <a:p>
+            <a:fld id="{02FF568C-74A2-4900-8608-468E9A6BA785}" type="slidenum">
+              <a:rPr lang="zh-CN" altLang="en-US" smtClean="0"/>
+              <a:t>‹#›</a:t>
+            </a:fld>
+            <a:endParaRPr lang="zh-CN" altLang="en-US"/>
+          </a:p>
+        </p:txBody>
+      </p:sp>
+    </p:spTree>
+    <p:extLst>
+      <p:ext uri="{BB962C8B-B14F-4D97-AF65-F5344CB8AC3E}">
+        <p14:creationId xmlns:p14="http://schemas.microsoft.com/office/powerpoint/2010/main" val="4073580244"/>
+      </p:ext>
+    </p:extLst>
+  </p:cSld>
+  <p:clrMapOvr>
+    <a:masterClrMapping/>
+  </p:clrMapOvr>
+</p:sldLayout>
+</file>
+
+<file path=ppt/slideLayouts/slideLayout11.xml><?xml version="1.0" encoding="utf-8"?>
 <p:sldLayout xmlns:a="http://schemas.openxmlformats.org/drawingml/2006/main" xmlns:r="http://schemas.openxmlformats.org/officeDocument/2006/relationships" xmlns:p="http://schemas.openxmlformats.org/presentationml/2006/main" type="vertTx" preserve="1">
   <p:cSld name="Title and Vertical Text">
     <p:spTree>
@@ -31855,7 +32664,7 @@
 </p:sldLayout>
 </file>
 
-<file path=ppt/slideLayouts/slideLayout11.xml><?xml version="1.0" encoding="utf-8"?>
+<file path=ppt/slideLayouts/slideLayout12.xml><?xml version="1.0" encoding="utf-8"?>
 <p:sldLayout xmlns:a="http://schemas.openxmlformats.org/drawingml/2006/main" xmlns:r="http://schemas.openxmlformats.org/officeDocument/2006/relationships" xmlns:p="http://schemas.openxmlformats.org/presentationml/2006/main" type="vertTitleAndTx" preserve="1">
   <p:cSld name="Vertical Title and Text">
     <p:spTree>
@@ -32202,6 +33011,36 @@
 </file>
 
 <file path=ppt/slideLayouts/slideLayout3.xml><?xml version="1.0" encoding="utf-8"?>
+<p:sldLayout xmlns:a="http://schemas.openxmlformats.org/drawingml/2006/main" xmlns:r="http://schemas.openxmlformats.org/officeDocument/2006/relationships" xmlns:p="http://schemas.openxmlformats.org/presentationml/2006/main" preserve="1" userDrawn="1">
+  <p:cSld name="1_Title and Content">
+    <p:spTree>
+      <p:nvGrpSpPr>
+        <p:cNvPr id="1" name=""/>
+        <p:cNvGrpSpPr/>
+        <p:nvPr/>
+      </p:nvGrpSpPr>
+      <p:grpSpPr>
+        <a:xfrm>
+          <a:off x="0" y="0"/>
+          <a:ext cx="0" cy="0"/>
+          <a:chOff x="0" y="0"/>
+          <a:chExt cx="0" cy="0"/>
+        </a:xfrm>
+      </p:grpSpPr>
+    </p:spTree>
+    <p:extLst>
+      <p:ext uri="{BB962C8B-B14F-4D97-AF65-F5344CB8AC3E}">
+        <p14:creationId xmlns:p14="http://schemas.microsoft.com/office/powerpoint/2010/main" val="1645561419"/>
+      </p:ext>
+    </p:extLst>
+  </p:cSld>
+  <p:clrMapOvr>
+    <a:masterClrMapping/>
+  </p:clrMapOvr>
+</p:sldLayout>
+</file>
+
+<file path=ppt/slideLayouts/slideLayout4.xml><?xml version="1.0" encoding="utf-8"?>
 <p:sldLayout xmlns:a="http://schemas.openxmlformats.org/drawingml/2006/main" xmlns:r="http://schemas.openxmlformats.org/officeDocument/2006/relationships" xmlns:p="http://schemas.openxmlformats.org/presentationml/2006/main" type="secHead" preserve="1">
   <p:cSld name="Section Header">
     <p:spTree>
@@ -32477,7 +33316,7 @@
 </p:sldLayout>
 </file>
 
-<file path=ppt/slideLayouts/slideLayout4.xml><?xml version="1.0" encoding="utf-8"?>
+<file path=ppt/slideLayouts/slideLayout5.xml><?xml version="1.0" encoding="utf-8"?>
 <p:sldLayout xmlns:a="http://schemas.openxmlformats.org/drawingml/2006/main" xmlns:r="http://schemas.openxmlformats.org/officeDocument/2006/relationships" xmlns:p="http://schemas.openxmlformats.org/presentationml/2006/main" type="twoObj" preserve="1">
   <p:cSld name="Two Content">
     <p:spTree>
@@ -32745,7 +33584,7 @@
 </p:sldLayout>
 </file>
 
-<file path=ppt/slideLayouts/slideLayout5.xml><?xml version="1.0" encoding="utf-8"?>
+<file path=ppt/slideLayouts/slideLayout6.xml><?xml version="1.0" encoding="utf-8"?>
 <p:sldLayout xmlns:a="http://schemas.openxmlformats.org/drawingml/2006/main" xmlns:r="http://schemas.openxmlformats.org/officeDocument/2006/relationships" xmlns:p="http://schemas.openxmlformats.org/presentationml/2006/main" type="twoTxTwoObj" preserve="1">
   <p:cSld name="Comparison">
     <p:spTree>
@@ -33160,7 +33999,7 @@
 </p:sldLayout>
 </file>
 
-<file path=ppt/slideLayouts/slideLayout6.xml><?xml version="1.0" encoding="utf-8"?>
+<file path=ppt/slideLayouts/slideLayout7.xml><?xml version="1.0" encoding="utf-8"?>
 <p:sldLayout xmlns:a="http://schemas.openxmlformats.org/drawingml/2006/main" xmlns:r="http://schemas.openxmlformats.org/officeDocument/2006/relationships" xmlns:p="http://schemas.openxmlformats.org/presentationml/2006/main" type="titleOnly" preserve="1">
   <p:cSld name="Title Only">
     <p:spTree>
@@ -33302,7 +34141,7 @@
 </p:sldLayout>
 </file>
 
-<file path=ppt/slideLayouts/slideLayout7.xml><?xml version="1.0" encoding="utf-8"?>
+<file path=ppt/slideLayouts/slideLayout8.xml><?xml version="1.0" encoding="utf-8"?>
 <p:sldLayout xmlns:a="http://schemas.openxmlformats.org/drawingml/2006/main" xmlns:r="http://schemas.openxmlformats.org/officeDocument/2006/relationships" xmlns:p="http://schemas.openxmlformats.org/presentationml/2006/main" type="blank" preserve="1">
   <p:cSld name="Blank">
     <p:spTree>
@@ -33469,7 +34308,7 @@
 </p:sldLayout>
 </file>
 
-<file path=ppt/slideLayouts/slideLayout8.xml><?xml version="1.0" encoding="utf-8"?>
+<file path=ppt/slideLayouts/slideLayout9.xml><?xml version="1.0" encoding="utf-8"?>
 <p:sldLayout xmlns:a="http://schemas.openxmlformats.org/drawingml/2006/main" xmlns:r="http://schemas.openxmlformats.org/officeDocument/2006/relationships" xmlns:p="http://schemas.openxmlformats.org/presentationml/2006/main" type="objTx" preserve="1">
   <p:cSld name="Content with Caption">
     <p:spTree>
@@ -33782,295 +34621,6 @@
 </p:sldLayout>
 </file>
 
-<file path=ppt/slideLayouts/slideLayout9.xml><?xml version="1.0" encoding="utf-8"?>
-<p:sldLayout xmlns:a="http://schemas.openxmlformats.org/drawingml/2006/main" xmlns:r="http://schemas.openxmlformats.org/officeDocument/2006/relationships" xmlns:p="http://schemas.openxmlformats.org/presentationml/2006/main" type="picTx" preserve="1">
-  <p:cSld name="Picture with Caption">
-    <p:spTree>
-      <p:nvGrpSpPr>
-        <p:cNvPr id="1" name=""/>
-        <p:cNvGrpSpPr/>
-        <p:nvPr/>
-      </p:nvGrpSpPr>
-      <p:grpSpPr>
-        <a:xfrm>
-          <a:off x="0" y="0"/>
-          <a:ext cx="0" cy="0"/>
-          <a:chOff x="0" y="0"/>
-          <a:chExt cx="0" cy="0"/>
-        </a:xfrm>
-      </p:grpSpPr>
-      <p:sp>
-        <p:nvSpPr>
-          <p:cNvPr id="2" name="Title 1">
-            <a:extLst>
-              <a:ext uri="{FF2B5EF4-FFF2-40B4-BE49-F238E27FC236}">
-                <a16:creationId xmlns:a16="http://schemas.microsoft.com/office/drawing/2014/main" id="{57FD32A1-CC95-46CB-B899-347D739EF1CD}"/>
-              </a:ext>
-            </a:extLst>
-          </p:cNvPr>
-          <p:cNvSpPr>
-            <a:spLocks noGrp="1"/>
-          </p:cNvSpPr>
-          <p:nvPr>
-            <p:ph type="title"/>
-          </p:nvPr>
-        </p:nvSpPr>
-        <p:spPr>
-          <a:xfrm>
-            <a:off x="839788" y="457200"/>
-            <a:ext cx="3932237" cy="1600200"/>
-          </a:xfrm>
-        </p:spPr>
-        <p:txBody>
-          <a:bodyPr anchor="b"/>
-          <a:lstStyle>
-            <a:lvl1pPr>
-              <a:defRPr sz="3200"/>
-            </a:lvl1pPr>
-          </a:lstStyle>
-          <a:p>
-            <a:r>
-              <a:rPr lang="en-US" altLang="zh-CN"/>
-              <a:t>Click to edit Master title style</a:t>
-            </a:r>
-            <a:endParaRPr lang="zh-CN" altLang="en-US"/>
-          </a:p>
-        </p:txBody>
-      </p:sp>
-      <p:sp>
-        <p:nvSpPr>
-          <p:cNvPr id="3" name="Picture Placeholder 2">
-            <a:extLst>
-              <a:ext uri="{FF2B5EF4-FFF2-40B4-BE49-F238E27FC236}">
-                <a16:creationId xmlns:a16="http://schemas.microsoft.com/office/drawing/2014/main" id="{B20C850C-7709-4E7D-B370-015508CA209F}"/>
-              </a:ext>
-            </a:extLst>
-          </p:cNvPr>
-          <p:cNvSpPr>
-            <a:spLocks noGrp="1"/>
-          </p:cNvSpPr>
-          <p:nvPr>
-            <p:ph type="pic" idx="1"/>
-          </p:nvPr>
-        </p:nvSpPr>
-        <p:spPr>
-          <a:xfrm>
-            <a:off x="5183188" y="987425"/>
-            <a:ext cx="6172200" cy="4873625"/>
-          </a:xfrm>
-        </p:spPr>
-        <p:txBody>
-          <a:bodyPr/>
-          <a:lstStyle>
-            <a:lvl1pPr marL="0" indent="0">
-              <a:buNone/>
-              <a:defRPr sz="3200"/>
-            </a:lvl1pPr>
-            <a:lvl2pPr marL="457200" indent="0">
-              <a:buNone/>
-              <a:defRPr sz="2800"/>
-            </a:lvl2pPr>
-            <a:lvl3pPr marL="914400" indent="0">
-              <a:buNone/>
-              <a:defRPr sz="2400"/>
-            </a:lvl3pPr>
-            <a:lvl4pPr marL="1371600" indent="0">
-              <a:buNone/>
-              <a:defRPr sz="2000"/>
-            </a:lvl4pPr>
-            <a:lvl5pPr marL="1828800" indent="0">
-              <a:buNone/>
-              <a:defRPr sz="2000"/>
-            </a:lvl5pPr>
-            <a:lvl6pPr marL="2286000" indent="0">
-              <a:buNone/>
-              <a:defRPr sz="2000"/>
-            </a:lvl6pPr>
-            <a:lvl7pPr marL="2743200" indent="0">
-              <a:buNone/>
-              <a:defRPr sz="2000"/>
-            </a:lvl7pPr>
-            <a:lvl8pPr marL="3200400" indent="0">
-              <a:buNone/>
-              <a:defRPr sz="2000"/>
-            </a:lvl8pPr>
-            <a:lvl9pPr marL="3657600" indent="0">
-              <a:buNone/>
-              <a:defRPr sz="2000"/>
-            </a:lvl9pPr>
-          </a:lstStyle>
-          <a:p>
-            <a:endParaRPr lang="zh-CN" altLang="en-US"/>
-          </a:p>
-        </p:txBody>
-      </p:sp>
-      <p:sp>
-        <p:nvSpPr>
-          <p:cNvPr id="4" name="Text Placeholder 3">
-            <a:extLst>
-              <a:ext uri="{FF2B5EF4-FFF2-40B4-BE49-F238E27FC236}">
-                <a16:creationId xmlns:a16="http://schemas.microsoft.com/office/drawing/2014/main" id="{964E966B-74CB-4C6C-85E4-68E9896FCDE5}"/>
-              </a:ext>
-            </a:extLst>
-          </p:cNvPr>
-          <p:cNvSpPr>
-            <a:spLocks noGrp="1"/>
-          </p:cNvSpPr>
-          <p:nvPr>
-            <p:ph type="body" sz="half" idx="2"/>
-          </p:nvPr>
-        </p:nvSpPr>
-        <p:spPr>
-          <a:xfrm>
-            <a:off x="839788" y="2057400"/>
-            <a:ext cx="3932237" cy="3811588"/>
-          </a:xfrm>
-        </p:spPr>
-        <p:txBody>
-          <a:bodyPr/>
-          <a:lstStyle>
-            <a:lvl1pPr marL="0" indent="0">
-              <a:buNone/>
-              <a:defRPr sz="1600"/>
-            </a:lvl1pPr>
-            <a:lvl2pPr marL="457200" indent="0">
-              <a:buNone/>
-              <a:defRPr sz="1400"/>
-            </a:lvl2pPr>
-            <a:lvl3pPr marL="914400" indent="0">
-              <a:buNone/>
-              <a:defRPr sz="1200"/>
-            </a:lvl3pPr>
-            <a:lvl4pPr marL="1371600" indent="0">
-              <a:buNone/>
-              <a:defRPr sz="1000"/>
-            </a:lvl4pPr>
-            <a:lvl5pPr marL="1828800" indent="0">
-              <a:buNone/>
-              <a:defRPr sz="1000"/>
-            </a:lvl5pPr>
-            <a:lvl6pPr marL="2286000" indent="0">
-              <a:buNone/>
-              <a:defRPr sz="1000"/>
-            </a:lvl6pPr>
-            <a:lvl7pPr marL="2743200" indent="0">
-              <a:buNone/>
-              <a:defRPr sz="1000"/>
-            </a:lvl7pPr>
-            <a:lvl8pPr marL="3200400" indent="0">
-              <a:buNone/>
-              <a:defRPr sz="1000"/>
-            </a:lvl8pPr>
-            <a:lvl9pPr marL="3657600" indent="0">
-              <a:buNone/>
-              <a:defRPr sz="1000"/>
-            </a:lvl9pPr>
-          </a:lstStyle>
-          <a:p>
-            <a:pPr lvl="0"/>
-            <a:r>
-              <a:rPr lang="en-US" altLang="zh-CN"/>
-              <a:t>Click to edit Master text styles</a:t>
-            </a:r>
-          </a:p>
-        </p:txBody>
-      </p:sp>
-      <p:sp>
-        <p:nvSpPr>
-          <p:cNvPr id="5" name="Date Placeholder 4">
-            <a:extLst>
-              <a:ext uri="{FF2B5EF4-FFF2-40B4-BE49-F238E27FC236}">
-                <a16:creationId xmlns:a16="http://schemas.microsoft.com/office/drawing/2014/main" id="{0240C91C-308B-4324-8091-FF3888B6A657}"/>
-              </a:ext>
-            </a:extLst>
-          </p:cNvPr>
-          <p:cNvSpPr>
-            <a:spLocks noGrp="1"/>
-          </p:cNvSpPr>
-          <p:nvPr>
-            <p:ph type="dt" sz="half" idx="10"/>
-          </p:nvPr>
-        </p:nvSpPr>
-        <p:spPr/>
-        <p:txBody>
-          <a:bodyPr/>
-          <a:lstStyle/>
-          <a:p>
-            <a:fld id="{9F89E671-33B1-43C9-86CB-BB04ADBAB0E4}" type="datetimeFigureOut">
-              <a:rPr lang="zh-CN" altLang="en-US" smtClean="0"/>
-              <a:t>2022/8/30</a:t>
-            </a:fld>
-            <a:endParaRPr lang="zh-CN" altLang="en-US"/>
-          </a:p>
-        </p:txBody>
-      </p:sp>
-      <p:sp>
-        <p:nvSpPr>
-          <p:cNvPr id="6" name="Footer Placeholder 5">
-            <a:extLst>
-              <a:ext uri="{FF2B5EF4-FFF2-40B4-BE49-F238E27FC236}">
-                <a16:creationId xmlns:a16="http://schemas.microsoft.com/office/drawing/2014/main" id="{0E41BF20-2E60-48AB-AA29-35590EA2EA77}"/>
-              </a:ext>
-            </a:extLst>
-          </p:cNvPr>
-          <p:cNvSpPr>
-            <a:spLocks noGrp="1"/>
-          </p:cNvSpPr>
-          <p:nvPr>
-            <p:ph type="ftr" sz="quarter" idx="11"/>
-          </p:nvPr>
-        </p:nvSpPr>
-        <p:spPr/>
-        <p:txBody>
-          <a:bodyPr/>
-          <a:lstStyle/>
-          <a:p>
-            <a:endParaRPr lang="zh-CN" altLang="en-US"/>
-          </a:p>
-        </p:txBody>
-      </p:sp>
-      <p:sp>
-        <p:nvSpPr>
-          <p:cNvPr id="7" name="Slide Number Placeholder 6">
-            <a:extLst>
-              <a:ext uri="{FF2B5EF4-FFF2-40B4-BE49-F238E27FC236}">
-                <a16:creationId xmlns:a16="http://schemas.microsoft.com/office/drawing/2014/main" id="{31F91B17-80EA-4DAA-8A1D-83949E7C6E0D}"/>
-              </a:ext>
-            </a:extLst>
-          </p:cNvPr>
-          <p:cNvSpPr>
-            <a:spLocks noGrp="1"/>
-          </p:cNvSpPr>
-          <p:nvPr>
-            <p:ph type="sldNum" sz="quarter" idx="12"/>
-          </p:nvPr>
-        </p:nvSpPr>
-        <p:spPr/>
-        <p:txBody>
-          <a:bodyPr/>
-          <a:lstStyle/>
-          <a:p>
-            <a:fld id="{02FF568C-74A2-4900-8608-468E9A6BA785}" type="slidenum">
-              <a:rPr lang="zh-CN" altLang="en-US" smtClean="0"/>
-              <a:t>‹#›</a:t>
-            </a:fld>
-            <a:endParaRPr lang="zh-CN" altLang="en-US"/>
-          </a:p>
-        </p:txBody>
-      </p:sp>
-    </p:spTree>
-    <p:extLst>
-      <p:ext uri="{BB962C8B-B14F-4D97-AF65-F5344CB8AC3E}">
-        <p14:creationId xmlns:p14="http://schemas.microsoft.com/office/powerpoint/2010/main" val="4073580244"/>
-      </p:ext>
-    </p:extLst>
-  </p:cSld>
-  <p:clrMapOvr>
-    <a:masterClrMapping/>
-  </p:clrMapOvr>
-</p:sldLayout>
-</file>
-
 <file path=ppt/slideMasters/slideMaster1.xml><?xml version="1.0" encoding="utf-8"?>
 <p:sldMaster xmlns:a="http://schemas.openxmlformats.org/drawingml/2006/main" xmlns:r="http://schemas.openxmlformats.org/officeDocument/2006/relationships" xmlns:p="http://schemas.openxmlformats.org/presentationml/2006/main">
   <p:cSld>
@@ -34348,15 +34898,16 @@
   <p:sldLayoutIdLst>
     <p:sldLayoutId id="2147483661" r:id="rId1"/>
     <p:sldLayoutId id="2147483662" r:id="rId2"/>
-    <p:sldLayoutId id="2147483663" r:id="rId3"/>
-    <p:sldLayoutId id="2147483664" r:id="rId4"/>
-    <p:sldLayoutId id="2147483665" r:id="rId5"/>
-    <p:sldLayoutId id="2147483666" r:id="rId6"/>
-    <p:sldLayoutId id="2147483667" r:id="rId7"/>
-    <p:sldLayoutId id="2147483668" r:id="rId8"/>
-    <p:sldLayoutId id="2147483669" r:id="rId9"/>
-    <p:sldLayoutId id="2147483670" r:id="rId10"/>
-    <p:sldLayoutId id="2147483671" r:id="rId11"/>
+    <p:sldLayoutId id="2147483672" r:id="rId3"/>
+    <p:sldLayoutId id="2147483663" r:id="rId4"/>
+    <p:sldLayoutId id="2147483664" r:id="rId5"/>
+    <p:sldLayoutId id="2147483665" r:id="rId6"/>
+    <p:sldLayoutId id="2147483666" r:id="rId7"/>
+    <p:sldLayoutId id="2147483667" r:id="rId8"/>
+    <p:sldLayoutId id="2147483668" r:id="rId9"/>
+    <p:sldLayoutId id="2147483669" r:id="rId10"/>
+    <p:sldLayoutId id="2147483670" r:id="rId11"/>
+    <p:sldLayoutId id="2147483671" r:id="rId12"/>
   </p:sldLayoutIdLst>
   <p:txStyles>
     <p:titleStyle>
@@ -34821,6 +35372,34 @@
           </a:p>
         </p:txBody>
       </p:sp>
+      <p:graphicFrame>
+        <p:nvGraphicFramePr>
+          <p:cNvPr id="4" name="Chart 3">
+            <a:extLst>
+              <a:ext uri="{FF2B5EF4-FFF2-40B4-BE49-F238E27FC236}">
+                <a16:creationId xmlns:a16="http://schemas.microsoft.com/office/drawing/2014/main" id="{E7795A0D-755D-BA7D-0845-A51D1B6D7167}"/>
+              </a:ext>
+            </a:extLst>
+          </p:cNvPr>
+          <p:cNvGraphicFramePr/>
+          <p:nvPr>
+            <p:extLst>
+              <p:ext uri="{D42A27DB-BD31-4B8C-83A1-F6EECF244321}">
+                <p14:modId xmlns:p14="http://schemas.microsoft.com/office/powerpoint/2010/main" val="180275019"/>
+              </p:ext>
+            </p:extLst>
+          </p:nvPr>
+        </p:nvGraphicFramePr>
+        <p:xfrm>
+          <a:off x="5125728" y="2190749"/>
+          <a:ext cx="6123297" cy="4200526"/>
+        </p:xfrm>
+        <a:graphic>
+          <a:graphicData uri="http://schemas.openxmlformats.org/drawingml/2006/chart">
+            <c:chart xmlns:c="http://schemas.openxmlformats.org/drawingml/2006/chart" xmlns:r="http://schemas.openxmlformats.org/officeDocument/2006/relationships" r:id="rId2"/>
+          </a:graphicData>
+        </a:graphic>
+      </p:graphicFrame>
       <p:sp>
         <p:nvSpPr>
           <p:cNvPr id="123" name="TextBox 122">
@@ -34836,7 +35415,7 @@
         <p:spPr>
           <a:xfrm>
             <a:off x="510556" y="386396"/>
-            <a:ext cx="11170886" cy="677108"/>
+            <a:ext cx="11170886" cy="1785104"/>
           </a:xfrm>
           <a:prstGeom prst="rect">
             <a:avLst/>
@@ -34880,7 +35459,29 @@
                 <a:ea typeface="Tahoma" panose="020B0604030504040204" pitchFamily="34" charset="0"/>
                 <a:cs typeface="Tahoma" panose="020B0604030504040204" pitchFamily="34" charset="0"/>
               </a:rPr>
-              <a:t>8th grade algebra 1 enrollment</a:t>
+              <a:t>8</a:t>
+            </a:r>
+            <a:r>
+              <a:rPr lang="sv-SE" altLang="zh-CN" sz="2000" baseline="30000" dirty="0">
+                <a:solidFill>
+                  <a:schemeClr val="tx2"/>
+                </a:solidFill>
+                <a:latin typeface="Antique Olive Std Compact" panose="020B0904030504040204" pitchFamily="34" charset="0"/>
+                <a:ea typeface="Tahoma" panose="020B0604030504040204" pitchFamily="34" charset="0"/>
+                <a:cs typeface="Tahoma" panose="020B0604030504040204" pitchFamily="34" charset="0"/>
+              </a:rPr>
+              <a:t>th</a:t>
+            </a:r>
+            <a:r>
+              <a:rPr lang="sv-SE" altLang="zh-CN" sz="2000" dirty="0">
+                <a:solidFill>
+                  <a:schemeClr val="tx2"/>
+                </a:solidFill>
+                <a:latin typeface="Antique Olive Std Compact" panose="020B0904030504040204" pitchFamily="34" charset="0"/>
+                <a:ea typeface="Tahoma" panose="020B0604030504040204" pitchFamily="34" charset="0"/>
+                <a:cs typeface="Tahoma" panose="020B0604030504040204" pitchFamily="34" charset="0"/>
+              </a:rPr>
+              <a:t> grade algebra 1 enrollment</a:t>
             </a:r>
             <a:endParaRPr lang="en-US" altLang="zh-CN" sz="2000" dirty="0">
               <a:solidFill>
@@ -34901,6 +35502,110 @@
               </a:rPr>
               <a:t>The proportion of CPS 8th graders enrolled into algebra 1 by race/ethnicity</a:t>
             </a:r>
+          </a:p>
+          <a:p>
+            <a:endParaRPr lang="en-US" altLang="zh-CN" sz="1800" dirty="0">
+              <a:solidFill>
+                <a:srgbClr val="4A4A4A"/>
+              </a:solidFill>
+              <a:latin typeface="ITC Officina Sans Std Book" panose="020B0506040203020204" pitchFamily="34" charset="0"/>
+            </a:endParaRPr>
+          </a:p>
+          <a:p>
+            <a:r>
+              <a:rPr lang="en-US" altLang="zh-CN" sz="1800" dirty="0">
+                <a:solidFill>
+                  <a:srgbClr val="4A4A4A"/>
+                </a:solidFill>
+                <a:latin typeface="ITC Officina Sans Std Book" panose="020B0506040203020204" pitchFamily="34" charset="0"/>
+              </a:rPr>
+              <a:t>8</a:t>
+            </a:r>
+            <a:r>
+              <a:rPr lang="en-US" altLang="zh-CN" sz="1800" baseline="30000" dirty="0">
+                <a:solidFill>
+                  <a:srgbClr val="4A4A4A"/>
+                </a:solidFill>
+                <a:latin typeface="ITC Officina Sans Std Book" panose="020B0506040203020204" pitchFamily="34" charset="0"/>
+              </a:rPr>
+              <a:t>th </a:t>
+            </a:r>
+            <a:r>
+              <a:rPr lang="en-US" altLang="zh-CN" sz="1800" dirty="0">
+                <a:solidFill>
+                  <a:srgbClr val="4A4A4A"/>
+                </a:solidFill>
+                <a:latin typeface="ITC Officina Sans Std Book" panose="020B0506040203020204" pitchFamily="34" charset="0"/>
+              </a:rPr>
+              <a:t>grader enroll algebra CHI / Total 8</a:t>
+            </a:r>
+            <a:r>
+              <a:rPr lang="en-US" altLang="zh-CN" sz="1800" baseline="30000" dirty="0">
+                <a:solidFill>
+                  <a:srgbClr val="4A4A4A"/>
+                </a:solidFill>
+                <a:latin typeface="ITC Officina Sans Std Book" panose="020B0506040203020204" pitchFamily="34" charset="0"/>
+              </a:rPr>
+              <a:t>th </a:t>
+            </a:r>
+            <a:r>
+              <a:rPr lang="en-US" altLang="zh-CN" sz="1800" dirty="0">
+                <a:solidFill>
+                  <a:srgbClr val="4A4A4A"/>
+                </a:solidFill>
+                <a:latin typeface="ITC Officina Sans Std Book" panose="020B0506040203020204" pitchFamily="34" charset="0"/>
+              </a:rPr>
+              <a:t>grader CHI</a:t>
+            </a:r>
+          </a:p>
+          <a:p>
+            <a:r>
+              <a:rPr lang="en-US" altLang="zh-CN" sz="1800" dirty="0">
+                <a:solidFill>
+                  <a:srgbClr val="4A4A4A"/>
+                </a:solidFill>
+                <a:latin typeface="ITC Officina Sans Std Book" panose="020B0506040203020204" pitchFamily="34" charset="0"/>
+              </a:rPr>
+              <a:t>Vs. 8</a:t>
+            </a:r>
+            <a:r>
+              <a:rPr lang="en-US" altLang="zh-CN" sz="1800" baseline="30000" dirty="0">
+                <a:solidFill>
+                  <a:srgbClr val="4A4A4A"/>
+                </a:solidFill>
+                <a:latin typeface="ITC Officina Sans Std Book" panose="020B0506040203020204" pitchFamily="34" charset="0"/>
+              </a:rPr>
+              <a:t>th </a:t>
+            </a:r>
+            <a:r>
+              <a:rPr lang="en-US" altLang="zh-CN" sz="1800" dirty="0">
+                <a:solidFill>
+                  <a:srgbClr val="4A4A4A"/>
+                </a:solidFill>
+                <a:latin typeface="ITC Officina Sans Std Book" panose="020B0506040203020204" pitchFamily="34" charset="0"/>
+              </a:rPr>
+              <a:t>grader enroll algebra US / Total 8</a:t>
+            </a:r>
+            <a:r>
+              <a:rPr lang="en-US" altLang="zh-CN" sz="1800" baseline="30000" dirty="0">
+                <a:solidFill>
+                  <a:srgbClr val="4A4A4A"/>
+                </a:solidFill>
+                <a:latin typeface="ITC Officina Sans Std Book" panose="020B0506040203020204" pitchFamily="34" charset="0"/>
+              </a:rPr>
+              <a:t>th </a:t>
+            </a:r>
+            <a:r>
+              <a:rPr lang="en-US" altLang="zh-CN" sz="1800" dirty="0">
+                <a:solidFill>
+                  <a:srgbClr val="4A4A4A"/>
+                </a:solidFill>
+                <a:latin typeface="ITC Officina Sans Std Book" panose="020B0506040203020204" pitchFamily="34" charset="0"/>
+              </a:rPr>
+              <a:t>grader US</a:t>
+            </a:r>
+          </a:p>
+          <a:p>
             <a:endParaRPr lang="zh-CN" altLang="en-US" dirty="0">
               <a:solidFill>
                 <a:srgbClr val="4A4A4A"/>
@@ -34910,40 +35615,12 @@
           </a:p>
         </p:txBody>
       </p:sp>
-      <p:graphicFrame>
-        <p:nvGraphicFramePr>
-          <p:cNvPr id="4" name="Chart 3">
+      <p:sp>
+        <p:nvSpPr>
+          <p:cNvPr id="6" name="TextBox 5">
             <a:extLst>
               <a:ext uri="{FF2B5EF4-FFF2-40B4-BE49-F238E27FC236}">
-                <a16:creationId xmlns:a16="http://schemas.microsoft.com/office/drawing/2014/main" id="{E7795A0D-755D-BA7D-0845-A51D1B6D7167}"/>
-              </a:ext>
-            </a:extLst>
-          </p:cNvPr>
-          <p:cNvGraphicFramePr/>
-          <p:nvPr>
-            <p:extLst>
-              <p:ext uri="{D42A27DB-BD31-4B8C-83A1-F6EECF244321}">
-                <p14:modId xmlns:p14="http://schemas.microsoft.com/office/powerpoint/2010/main" val="3613371817"/>
-              </p:ext>
-            </p:extLst>
-          </p:nvPr>
-        </p:nvGraphicFramePr>
-        <p:xfrm>
-          <a:off x="4344678" y="1818733"/>
-          <a:ext cx="6729722" cy="4486482"/>
-        </p:xfrm>
-        <a:graphic>
-          <a:graphicData uri="http://schemas.openxmlformats.org/drawingml/2006/chart">
-            <c:chart xmlns:c="http://schemas.openxmlformats.org/drawingml/2006/chart" xmlns:r="http://schemas.openxmlformats.org/officeDocument/2006/relationships" r:id="rId2"/>
-          </a:graphicData>
-        </a:graphic>
-      </p:graphicFrame>
-      <p:sp>
-        <p:nvSpPr>
-          <p:cNvPr id="9" name="TextBox 8">
-            <a:extLst>
-              <a:ext uri="{FF2B5EF4-FFF2-40B4-BE49-F238E27FC236}">
-                <a16:creationId xmlns:a16="http://schemas.microsoft.com/office/drawing/2014/main" id="{62B8DE2A-BC27-0796-2B38-02972343D804}"/>
+                <a16:creationId xmlns:a16="http://schemas.microsoft.com/office/drawing/2014/main" id="{1F33623B-1500-CB7E-F3A6-B2E4C74F68B1}"/>
               </a:ext>
             </a:extLst>
           </p:cNvPr>
@@ -34952,8 +35629,8 @@
         </p:nvSpPr>
         <p:spPr>
           <a:xfrm>
-            <a:off x="510556" y="2976666"/>
-            <a:ext cx="3401044" cy="646331"/>
+            <a:off x="581025" y="2190749"/>
+            <a:ext cx="3714750" cy="3416320"/>
           </a:xfrm>
           <a:prstGeom prst="rect">
             <a:avLst/>
@@ -34967,23 +35644,28 @@
           <a:lstStyle/>
           <a:p>
             <a:r>
-              <a:rPr lang="en-US" altLang="zh-CN" sz="1200" dirty="0">
+              <a:rPr lang="en-US" altLang="zh-CN" sz="1200" b="1" u="sng" dirty="0">
                 <a:solidFill>
                   <a:srgbClr val="4A4A4A"/>
                 </a:solidFill>
                 <a:latin typeface="ITC Officina Sans Std Book" panose="020B0506040203020204" pitchFamily="34" charset="0"/>
               </a:rPr>
-              <a:t>8</a:t>
+              <a:t>What does the data tell?</a:t>
             </a:r>
-            <a:r>
-              <a:rPr lang="en-US" altLang="zh-CN" sz="1200" baseline="30000" dirty="0">
-                <a:solidFill>
-                  <a:srgbClr val="4A4A4A"/>
-                </a:solidFill>
-                <a:latin typeface="ITC Officina Sans Std Book" panose="020B0506040203020204" pitchFamily="34" charset="0"/>
-              </a:rPr>
-              <a:t>th </a:t>
-            </a:r>
+          </a:p>
+          <a:p>
+            <a:endParaRPr lang="en-US" altLang="zh-CN" sz="1200" b="1" u="sng" dirty="0">
+              <a:solidFill>
+                <a:srgbClr val="4A4A4A"/>
+              </a:solidFill>
+              <a:latin typeface="ITC Officina Sans Std Book" panose="020B0506040203020204" pitchFamily="34" charset="0"/>
+            </a:endParaRPr>
+          </a:p>
+          <a:p>
+            <a:pPr marL="171450" indent="-171450">
+              <a:buFont typeface="Arial" panose="020B0604020202020204" pitchFamily="34" charset="0"/>
+              <a:buChar char="•"/>
+            </a:pPr>
             <a:r>
               <a:rPr lang="en-US" altLang="zh-CN" sz="1200" dirty="0">
                 <a:solidFill>
@@ -34991,17 +35673,26 @@
                 </a:solidFill>
                 <a:latin typeface="ITC Officina Sans Std Book" panose="020B0506040203020204" pitchFamily="34" charset="0"/>
               </a:rPr>
-              <a:t>grader enroll algebra CHI / Total 8</a:t>
+              <a:t>The algebra enrollment rate of Asians and white students is significantly higher than that of Hispanic and Black students. 2.4 times higher than Hispanics, and 4.4 times higher than black.</a:t>
             </a:r>
-            <a:r>
-              <a:rPr lang="en-US" altLang="zh-CN" sz="1200" baseline="30000" dirty="0">
-                <a:solidFill>
-                  <a:srgbClr val="4A4A4A"/>
-                </a:solidFill>
-                <a:latin typeface="ITC Officina Sans Std Book" panose="020B0506040203020204" pitchFamily="34" charset="0"/>
-              </a:rPr>
-              <a:t>th </a:t>
-            </a:r>
+          </a:p>
+          <a:p>
+            <a:pPr marL="171450" indent="-171450">
+              <a:buFont typeface="Arial" panose="020B0604020202020204" pitchFamily="34" charset="0"/>
+              <a:buChar char="•"/>
+            </a:pPr>
+            <a:endParaRPr lang="en-US" altLang="zh-CN" sz="1200" dirty="0">
+              <a:solidFill>
+                <a:srgbClr val="4A4A4A"/>
+              </a:solidFill>
+              <a:latin typeface="ITC Officina Sans Std Book" panose="020B0506040203020204" pitchFamily="34" charset="0"/>
+            </a:endParaRPr>
+          </a:p>
+          <a:p>
+            <a:pPr marL="171450" indent="-171450">
+              <a:buFont typeface="Arial" panose="020B0604020202020204" pitchFamily="34" charset="0"/>
+              <a:buChar char="•"/>
+            </a:pPr>
             <a:r>
               <a:rPr lang="en-US" altLang="zh-CN" sz="1200" dirty="0">
                 <a:solidFill>
@@ -35009,10 +35700,41 @@
                 </a:solidFill>
                 <a:latin typeface="ITC Officina Sans Std Book" panose="020B0506040203020204" pitchFamily="34" charset="0"/>
               </a:rPr>
-              <a:t>grader CHI</a:t>
+              <a:t>Significant gap between H/B and W/A. The algebra 1 class enrollment rates for White and Asian in CPS are 14-20% higher than the national average, however, that of Hispanics and Black students is 2% higher and 3% lower than the national average.</a:t>
             </a:r>
           </a:p>
           <a:p>
+            <a:endParaRPr lang="en-US" altLang="zh-CN" sz="1200" dirty="0">
+              <a:solidFill>
+                <a:srgbClr val="4A4A4A"/>
+              </a:solidFill>
+              <a:latin typeface="ITC Officina Sans Std Book" panose="020B0506040203020204" pitchFamily="34" charset="0"/>
+            </a:endParaRPr>
+          </a:p>
+          <a:p>
+            <a:r>
+              <a:rPr lang="en-US" altLang="zh-CN" sz="1200" b="1" u="sng" dirty="0">
+                <a:solidFill>
+                  <a:srgbClr val="4A4A4A"/>
+                </a:solidFill>
+                <a:latin typeface="ITC Officina Sans Std Book" panose="020B0506040203020204" pitchFamily="34" charset="0"/>
+              </a:rPr>
+              <a:t>Takeaways</a:t>
+            </a:r>
+          </a:p>
+          <a:p>
+            <a:endParaRPr lang="en-US" altLang="zh-CN" sz="1200" b="1" u="sng" dirty="0">
+              <a:solidFill>
+                <a:srgbClr val="4A4A4A"/>
+              </a:solidFill>
+              <a:latin typeface="ITC Officina Sans Std Book" panose="020B0506040203020204" pitchFamily="34" charset="0"/>
+            </a:endParaRPr>
+          </a:p>
+          <a:p>
+            <a:pPr marL="171450" indent="-171450">
+              <a:buFont typeface="Arial" panose="020B0604020202020204" pitchFamily="34" charset="0"/>
+              <a:buChar char="•"/>
+            </a:pPr>
             <a:r>
               <a:rPr lang="en-US" altLang="zh-CN" sz="1200" dirty="0">
                 <a:solidFill>
@@ -35020,54 +35742,7 @@
                 </a:solidFill>
                 <a:latin typeface="ITC Officina Sans Std Book" panose="020B0506040203020204" pitchFamily="34" charset="0"/>
               </a:rPr>
-              <a:t>Vs. </a:t>
-            </a:r>
-          </a:p>
-          <a:p>
-            <a:r>
-              <a:rPr lang="en-US" altLang="zh-CN" sz="1200" dirty="0">
-                <a:solidFill>
-                  <a:srgbClr val="4A4A4A"/>
-                </a:solidFill>
-                <a:latin typeface="ITC Officina Sans Std Book" panose="020B0506040203020204" pitchFamily="34" charset="0"/>
-              </a:rPr>
-              <a:t>8</a:t>
-            </a:r>
-            <a:r>
-              <a:rPr lang="en-US" altLang="zh-CN" sz="1200" baseline="30000" dirty="0">
-                <a:solidFill>
-                  <a:srgbClr val="4A4A4A"/>
-                </a:solidFill>
-                <a:latin typeface="ITC Officina Sans Std Book" panose="020B0506040203020204" pitchFamily="34" charset="0"/>
-              </a:rPr>
-              <a:t>th </a:t>
-            </a:r>
-            <a:r>
-              <a:rPr lang="en-US" altLang="zh-CN" sz="1200" dirty="0">
-                <a:solidFill>
-                  <a:srgbClr val="4A4A4A"/>
-                </a:solidFill>
-                <a:latin typeface="ITC Officina Sans Std Book" panose="020B0506040203020204" pitchFamily="34" charset="0"/>
-              </a:rPr>
-              <a:t>grader enroll algebra US / Total 8</a:t>
-            </a:r>
-            <a:r>
-              <a:rPr lang="en-US" altLang="zh-CN" sz="1200" baseline="30000" dirty="0">
-                <a:solidFill>
-                  <a:srgbClr val="4A4A4A"/>
-                </a:solidFill>
-                <a:latin typeface="ITC Officina Sans Std Book" panose="020B0506040203020204" pitchFamily="34" charset="0"/>
-              </a:rPr>
-              <a:t>th </a:t>
-            </a:r>
-            <a:r>
-              <a:rPr lang="en-US" altLang="zh-CN" sz="1200" dirty="0">
-                <a:solidFill>
-                  <a:srgbClr val="4A4A4A"/>
-                </a:solidFill>
-                <a:latin typeface="ITC Officina Sans Std Book" panose="020B0506040203020204" pitchFamily="34" charset="0"/>
-              </a:rPr>
-              <a:t>grader US</a:t>
+              <a:t>In relation to the national average algebra enrollment rate, White and Asian students are outperforming, while black students are outperformed.</a:t>
             </a:r>
           </a:p>
         </p:txBody>
@@ -35164,7 +35839,7 @@
         <p:spPr>
           <a:xfrm>
             <a:off x="510556" y="386396"/>
-            <a:ext cx="11170886" cy="677108"/>
+            <a:ext cx="11170886" cy="1508105"/>
           </a:xfrm>
           <a:prstGeom prst="rect">
             <a:avLst/>
@@ -35197,7 +35872,7 @@
                 <a:ea typeface="Tahoma" panose="020B0604030504040204" pitchFamily="34" charset="0"/>
                 <a:cs typeface="Tahoma" panose="020B0604030504040204" pitchFamily="34" charset="0"/>
               </a:rPr>
-              <a:t>: Lack of Internet Access</a:t>
+              <a:t>: Lack of Household Internet Access</a:t>
             </a:r>
           </a:p>
           <a:p>
@@ -35208,75 +35883,37 @@
                 </a:solidFill>
                 <a:latin typeface="ITC Officina Sans Std Book" panose="020B0506040203020204" pitchFamily="34" charset="0"/>
               </a:rPr>
-              <a:t>The proportion of students lacking internet access by race/ethnicity</a:t>
+              <a:t>The proportion of young residents lacking household internet access by race/ethnicity</a:t>
             </a:r>
-            <a:endParaRPr lang="zh-CN" altLang="en-US" dirty="0">
+          </a:p>
+          <a:p>
+            <a:endParaRPr lang="en-US" altLang="zh-CN" dirty="0">
               <a:solidFill>
                 <a:srgbClr val="4A4A4A"/>
               </a:solidFill>
               <a:latin typeface="ITC Officina Sans Std Book" panose="020B0506040203020204" pitchFamily="34" charset="0"/>
             </a:endParaRPr>
           </a:p>
-        </p:txBody>
-      </p:sp>
-      <p:sp>
-        <p:nvSpPr>
-          <p:cNvPr id="12" name="TextBox 11">
-            <a:extLst>
-              <a:ext uri="{FF2B5EF4-FFF2-40B4-BE49-F238E27FC236}">
-                <a16:creationId xmlns:a16="http://schemas.microsoft.com/office/drawing/2014/main" id="{9C6672FC-7502-04F6-E4D2-9B68357344AE}"/>
-              </a:ext>
-            </a:extLst>
-          </p:cNvPr>
-          <p:cNvSpPr txBox="1"/>
-          <p:nvPr/>
-        </p:nvSpPr>
-        <p:spPr>
-          <a:xfrm>
-            <a:off x="510555" y="2967335"/>
-            <a:ext cx="3689969" cy="646331"/>
-          </a:xfrm>
-          <a:prstGeom prst="rect">
-            <a:avLst/>
-          </a:prstGeom>
-          <a:noFill/>
-        </p:spPr>
-        <p:txBody>
-          <a:bodyPr wrap="square" rtlCol="0">
-            <a:spAutoFit/>
-          </a:bodyPr>
-          <a:lstStyle/>
           <a:p>
             <a:r>
-              <a:rPr lang="en-US" altLang="zh-CN" sz="1200" dirty="0">
+              <a:rPr lang="en-US" altLang="zh-CN" sz="1800" dirty="0">
                 <a:solidFill>
                   <a:srgbClr val="4A4A4A"/>
                 </a:solidFill>
                 <a:latin typeface="ITC Officina Sans Std Book" panose="020B0506040203020204" pitchFamily="34" charset="0"/>
               </a:rPr>
-              <a:t>Age 5-17 no internet / Total population of 5-17 chi</a:t>
+              <a:t>Age 5-17 no internet CHI / Total population of 5-17 CHI</a:t>
             </a:r>
           </a:p>
           <a:p>
             <a:r>
-              <a:rPr lang="en-US" altLang="zh-CN" sz="1200" dirty="0">
+              <a:rPr lang="en-US" altLang="zh-CN" sz="1800" dirty="0">
                 <a:solidFill>
                   <a:srgbClr val="4A4A4A"/>
                 </a:solidFill>
                 <a:latin typeface="ITC Officina Sans Std Book" panose="020B0506040203020204" pitchFamily="34" charset="0"/>
               </a:rPr>
-              <a:t>Vs. </a:t>
-            </a:r>
-          </a:p>
-          <a:p>
-            <a:r>
-              <a:rPr lang="en-US" altLang="zh-CN" sz="1200" dirty="0">
-                <a:solidFill>
-                  <a:srgbClr val="4A4A4A"/>
-                </a:solidFill>
-                <a:latin typeface="ITC Officina Sans Std Book" panose="020B0506040203020204" pitchFamily="34" charset="0"/>
-              </a:rPr>
-              <a:t>Age 5-17 no internet US / Total population of 5-17 US</a:t>
+              <a:t>Vs. Age 5-17 no internet US / Total population of 5-17 US</a:t>
             </a:r>
           </a:p>
         </p:txBody>
@@ -35294,14 +35931,14 @@
           <p:nvPr>
             <p:extLst>
               <p:ext uri="{D42A27DB-BD31-4B8C-83A1-F6EECF244321}">
-                <p14:modId xmlns:p14="http://schemas.microsoft.com/office/powerpoint/2010/main" val="2167499578"/>
+                <p14:modId xmlns:p14="http://schemas.microsoft.com/office/powerpoint/2010/main" val="1696879444"/>
               </p:ext>
             </p:extLst>
           </p:nvPr>
         </p:nvGraphicFramePr>
         <p:xfrm>
-          <a:off x="4970816" y="2026331"/>
-          <a:ext cx="5853781" cy="3902521"/>
+          <a:off x="5132741" y="2188256"/>
+          <a:ext cx="6106759" cy="4183969"/>
         </p:xfrm>
         <a:graphic>
           <a:graphicData uri="http://schemas.openxmlformats.org/drawingml/2006/chart">
@@ -35309,6 +35946,165 @@
           </a:graphicData>
         </a:graphic>
       </p:graphicFrame>
+      <p:sp>
+        <p:nvSpPr>
+          <p:cNvPr id="6" name="TextBox 5">
+            <a:extLst>
+              <a:ext uri="{FF2B5EF4-FFF2-40B4-BE49-F238E27FC236}">
+                <a16:creationId xmlns:a16="http://schemas.microsoft.com/office/drawing/2014/main" id="{A02F439C-C13C-5B91-CD36-2078B758FA64}"/>
+              </a:ext>
+            </a:extLst>
+          </p:cNvPr>
+          <p:cNvSpPr txBox="1"/>
+          <p:nvPr/>
+        </p:nvSpPr>
+        <p:spPr>
+          <a:xfrm>
+            <a:off x="581025" y="2190749"/>
+            <a:ext cx="3714750" cy="4154984"/>
+          </a:xfrm>
+          <a:prstGeom prst="rect">
+            <a:avLst/>
+          </a:prstGeom>
+          <a:noFill/>
+        </p:spPr>
+        <p:txBody>
+          <a:bodyPr wrap="square" rtlCol="0">
+            <a:spAutoFit/>
+          </a:bodyPr>
+          <a:lstStyle/>
+          <a:p>
+            <a:r>
+              <a:rPr lang="en-US" altLang="zh-CN" sz="1200" b="1" u="sng" dirty="0">
+                <a:solidFill>
+                  <a:srgbClr val="4A4A4A"/>
+                </a:solidFill>
+                <a:latin typeface="ITC Officina Sans Std Book" panose="020B0506040203020204" pitchFamily="34" charset="0"/>
+              </a:rPr>
+              <a:t>What does the data tell?</a:t>
+            </a:r>
+          </a:p>
+          <a:p>
+            <a:endParaRPr lang="en-US" altLang="zh-CN" sz="1200" b="1" u="sng" dirty="0">
+              <a:solidFill>
+                <a:srgbClr val="4A4A4A"/>
+              </a:solidFill>
+              <a:latin typeface="ITC Officina Sans Std Book" panose="020B0506040203020204" pitchFamily="34" charset="0"/>
+            </a:endParaRPr>
+          </a:p>
+          <a:p>
+            <a:pPr marL="171450" indent="-171450">
+              <a:buFont typeface="Arial" panose="020B0604020202020204" pitchFamily="34" charset="0"/>
+              <a:buChar char="•"/>
+            </a:pPr>
+            <a:r>
+              <a:rPr lang="en-US" altLang="zh-CN" sz="1200" dirty="0">
+                <a:solidFill>
+                  <a:srgbClr val="4A4A4A"/>
+                </a:solidFill>
+                <a:latin typeface="ITC Officina Sans Std Book" panose="020B0506040203020204" pitchFamily="34" charset="0"/>
+              </a:rPr>
+              <a:t>In Chicago, almost 2 out of 10 black and Hispanic populations aged from 5 to 17 don’t have household internet access, in comparison with 1 out of 10 white and Asian populations don’t have household internet access.</a:t>
+            </a:r>
+          </a:p>
+          <a:p>
+            <a:pPr marL="171450" indent="-171450">
+              <a:buFont typeface="Arial" panose="020B0604020202020204" pitchFamily="34" charset="0"/>
+              <a:buChar char="•"/>
+            </a:pPr>
+            <a:endParaRPr lang="en-US" altLang="zh-CN" sz="1200" dirty="0">
+              <a:solidFill>
+                <a:srgbClr val="4A4A4A"/>
+              </a:solidFill>
+              <a:latin typeface="ITC Officina Sans Std Book" panose="020B0506040203020204" pitchFamily="34" charset="0"/>
+            </a:endParaRPr>
+          </a:p>
+          <a:p>
+            <a:pPr marL="171450" indent="-171450">
+              <a:buFont typeface="Arial" panose="020B0604020202020204" pitchFamily="34" charset="0"/>
+              <a:buChar char="•"/>
+            </a:pPr>
+            <a:r>
+              <a:rPr lang="en-US" altLang="zh-CN" sz="1200" dirty="0">
+                <a:solidFill>
+                  <a:srgbClr val="4A4A4A"/>
+                </a:solidFill>
+                <a:latin typeface="ITC Officina Sans Std Book" panose="020B0506040203020204" pitchFamily="34" charset="0"/>
+              </a:rPr>
+              <a:t>Overall, the younger population in Chicago has a significantly lower (11.3% to 17.3%) household Internet access rate in comparison with the national average across all ethnic groups.</a:t>
+            </a:r>
+          </a:p>
+          <a:p>
+            <a:endParaRPr lang="en-US" altLang="zh-CN" sz="1200" dirty="0">
+              <a:solidFill>
+                <a:srgbClr val="4A4A4A"/>
+              </a:solidFill>
+              <a:latin typeface="ITC Officina Sans Std Book" panose="020B0506040203020204" pitchFamily="34" charset="0"/>
+            </a:endParaRPr>
+          </a:p>
+          <a:p>
+            <a:r>
+              <a:rPr lang="en-US" altLang="zh-CN" sz="1200" b="1" u="sng" dirty="0">
+                <a:solidFill>
+                  <a:srgbClr val="4A4A4A"/>
+                </a:solidFill>
+                <a:latin typeface="ITC Officina Sans Std Book" panose="020B0506040203020204" pitchFamily="34" charset="0"/>
+              </a:rPr>
+              <a:t>Takeaways</a:t>
+            </a:r>
+          </a:p>
+          <a:p>
+            <a:endParaRPr lang="en-US" altLang="zh-CN" sz="1200" b="1" u="sng" dirty="0">
+              <a:solidFill>
+                <a:srgbClr val="4A4A4A"/>
+              </a:solidFill>
+              <a:latin typeface="ITC Officina Sans Std Book" panose="020B0506040203020204" pitchFamily="34" charset="0"/>
+            </a:endParaRPr>
+          </a:p>
+          <a:p>
+            <a:pPr marL="171450" indent="-171450">
+              <a:buFont typeface="Arial" panose="020B0604020202020204" pitchFamily="34" charset="0"/>
+              <a:buChar char="•"/>
+            </a:pPr>
+            <a:r>
+              <a:rPr lang="en-US" altLang="zh-CN" sz="1200" dirty="0">
+                <a:solidFill>
+                  <a:srgbClr val="4A4A4A"/>
+                </a:solidFill>
+                <a:latin typeface="ITC Officina Sans Std Book" panose="020B0506040203020204" pitchFamily="34" charset="0"/>
+              </a:rPr>
+              <a:t>The proportion of black children and teenagers who do not have household internet access is 9 times higher than the national average. </a:t>
+            </a:r>
+          </a:p>
+          <a:p>
+            <a:pPr marL="171450" indent="-171450">
+              <a:buFont typeface="Arial" panose="020B0604020202020204" pitchFamily="34" charset="0"/>
+              <a:buChar char="•"/>
+            </a:pPr>
+            <a:endParaRPr lang="en-US" altLang="zh-CN" sz="1200" dirty="0">
+              <a:solidFill>
+                <a:srgbClr val="4A4A4A"/>
+              </a:solidFill>
+              <a:latin typeface="ITC Officina Sans Std Book" panose="020B0506040203020204" pitchFamily="34" charset="0"/>
+            </a:endParaRPr>
+          </a:p>
+          <a:p>
+            <a:pPr marL="171450" indent="-171450">
+              <a:buFont typeface="Arial" panose="020B0604020202020204" pitchFamily="34" charset="0"/>
+              <a:buChar char="•"/>
+            </a:pPr>
+            <a:r>
+              <a:rPr lang="en-US" altLang="zh-CN" sz="1200" dirty="0">
+                <a:solidFill>
+                  <a:srgbClr val="4A4A4A"/>
+                </a:solidFill>
+                <a:latin typeface="ITC Officina Sans Std Book" panose="020B0506040203020204" pitchFamily="34" charset="0"/>
+              </a:rPr>
+              <a:t>The proportion of Hispanic children and teenagers who do not have household internet access is 2.7 times higher than the national average</a:t>
+            </a:r>
+          </a:p>
+        </p:txBody>
+      </p:sp>
     </p:spTree>
     <p:extLst>
       <p:ext uri="{BB962C8B-B14F-4D97-AF65-F5344CB8AC3E}">
@@ -35487,7 +36283,7 @@
         <p:spPr>
           <a:xfrm>
             <a:off x="510556" y="386396"/>
-            <a:ext cx="11170886" cy="677108"/>
+            <a:ext cx="11170886" cy="1508105"/>
           </a:xfrm>
           <a:prstGeom prst="rect">
             <a:avLst/>
@@ -35520,7 +36316,7 @@
                 <a:ea typeface="Tahoma" panose="020B0604030504040204" pitchFamily="34" charset="0"/>
                 <a:cs typeface="Tahoma" panose="020B0604030504040204" pitchFamily="34" charset="0"/>
               </a:rPr>
-              <a:t>: CPS HS SAT Math Proficiency and Above </a:t>
+              <a:t>: HS SAT Math Proficiency and Above </a:t>
             </a:r>
           </a:p>
           <a:p>
@@ -35533,45 +36329,18 @@
               </a:rPr>
               <a:t>The proportion of CPS SAT takers at or above math standards by race/ethnicity</a:t>
             </a:r>
-            <a:endParaRPr lang="zh-CN" altLang="en-US" dirty="0">
+          </a:p>
+          <a:p>
+            <a:endParaRPr lang="en-US" altLang="zh-CN" sz="1800" dirty="0">
               <a:solidFill>
                 <a:srgbClr val="4A4A4A"/>
               </a:solidFill>
               <a:latin typeface="ITC Officina Sans Std Book" panose="020B0506040203020204" pitchFamily="34" charset="0"/>
             </a:endParaRPr>
           </a:p>
-        </p:txBody>
-      </p:sp>
-      <p:sp>
-        <p:nvSpPr>
-          <p:cNvPr id="12" name="TextBox 11">
-            <a:extLst>
-              <a:ext uri="{FF2B5EF4-FFF2-40B4-BE49-F238E27FC236}">
-                <a16:creationId xmlns:a16="http://schemas.microsoft.com/office/drawing/2014/main" id="{9C6672FC-7502-04F6-E4D2-9B68357344AE}"/>
-              </a:ext>
-            </a:extLst>
-          </p:cNvPr>
-          <p:cNvSpPr txBox="1"/>
-          <p:nvPr/>
-        </p:nvSpPr>
-        <p:spPr>
-          <a:xfrm>
-            <a:off x="510556" y="2967335"/>
-            <a:ext cx="3401044" cy="646331"/>
-          </a:xfrm>
-          <a:prstGeom prst="rect">
-            <a:avLst/>
-          </a:prstGeom>
-          <a:noFill/>
-        </p:spPr>
-        <p:txBody>
-          <a:bodyPr wrap="square" rtlCol="0">
-            <a:spAutoFit/>
-          </a:bodyPr>
-          <a:lstStyle/>
           <a:p>
             <a:r>
-              <a:rPr lang="en-US" altLang="zh-CN" sz="1200" dirty="0">
+              <a:rPr lang="en-US" altLang="zh-CN" sz="1800" dirty="0">
                 <a:solidFill>
                   <a:srgbClr val="4A4A4A"/>
                 </a:solidFill>
@@ -35582,25 +36351,20 @@
           </a:p>
           <a:p>
             <a:r>
-              <a:rPr lang="en-US" altLang="zh-CN" sz="1200" dirty="0">
+              <a:rPr lang="en-US" altLang="zh-CN" sz="1800" dirty="0">
                 <a:solidFill>
                   <a:srgbClr val="4A4A4A"/>
                 </a:solidFill>
                 <a:latin typeface="ITC Officina Sans Std Book" panose="020B0506040203020204" pitchFamily="34" charset="0"/>
               </a:rPr>
-              <a:t>Vs. </a:t>
+              <a:t>Vs. SAT math meet and above/ SAT takers US</a:t>
             </a:r>
-          </a:p>
-          <a:p>
-            <a:r>
-              <a:rPr lang="en-US" altLang="zh-CN" sz="1200" dirty="0">
-                <a:solidFill>
-                  <a:srgbClr val="4A4A4A"/>
-                </a:solidFill>
-                <a:latin typeface="ITC Officina Sans Std Book" panose="020B0506040203020204" pitchFamily="34" charset="0"/>
-              </a:rPr>
-              <a:t>SAT math meet and above/ SAT takers US</a:t>
-            </a:r>
+            <a:endParaRPr lang="zh-CN" altLang="en-US" dirty="0">
+              <a:solidFill>
+                <a:srgbClr val="4A4A4A"/>
+              </a:solidFill>
+              <a:latin typeface="ITC Officina Sans Std Book" panose="020B0506040203020204" pitchFamily="34" charset="0"/>
+            </a:endParaRPr>
           </a:p>
         </p:txBody>
       </p:sp>
@@ -35617,14 +36381,14 @@
           <p:nvPr>
             <p:extLst>
               <p:ext uri="{D42A27DB-BD31-4B8C-83A1-F6EECF244321}">
-                <p14:modId xmlns:p14="http://schemas.microsoft.com/office/powerpoint/2010/main" val="1845052392"/>
+                <p14:modId xmlns:p14="http://schemas.microsoft.com/office/powerpoint/2010/main" val="1638618681"/>
               </p:ext>
             </p:extLst>
           </p:nvPr>
         </p:nvGraphicFramePr>
         <p:xfrm>
-          <a:off x="3576319" y="1537772"/>
-          <a:ext cx="6647179" cy="4431453"/>
+          <a:off x="5140592" y="2197245"/>
+          <a:ext cx="6089383" cy="4203555"/>
         </p:xfrm>
         <a:graphic>
           <a:graphicData uri="http://schemas.openxmlformats.org/drawingml/2006/chart">
@@ -35632,6 +36396,160 @@
           </a:graphicData>
         </a:graphic>
       </p:graphicFrame>
+      <p:sp>
+        <p:nvSpPr>
+          <p:cNvPr id="7" name="TextBox 6">
+            <a:extLst>
+              <a:ext uri="{FF2B5EF4-FFF2-40B4-BE49-F238E27FC236}">
+                <a16:creationId xmlns:a16="http://schemas.microsoft.com/office/drawing/2014/main" id="{5F80CCD0-ED5E-CFA8-9CA4-9DB7FD443017}"/>
+              </a:ext>
+            </a:extLst>
+          </p:cNvPr>
+          <p:cNvSpPr txBox="1"/>
+          <p:nvPr/>
+        </p:nvSpPr>
+        <p:spPr>
+          <a:xfrm>
+            <a:off x="581025" y="2190749"/>
+            <a:ext cx="3714750" cy="3231654"/>
+          </a:xfrm>
+          <a:prstGeom prst="rect">
+            <a:avLst/>
+          </a:prstGeom>
+          <a:noFill/>
+        </p:spPr>
+        <p:txBody>
+          <a:bodyPr wrap="square" rtlCol="0">
+            <a:spAutoFit/>
+          </a:bodyPr>
+          <a:lstStyle/>
+          <a:p>
+            <a:r>
+              <a:rPr lang="en-US" altLang="zh-CN" sz="1200" b="1" u="sng" dirty="0">
+                <a:solidFill>
+                  <a:srgbClr val="4A4A4A"/>
+                </a:solidFill>
+                <a:latin typeface="ITC Officina Sans Std Book" panose="020B0506040203020204" pitchFamily="34" charset="0"/>
+              </a:rPr>
+              <a:t>What does the data tell?</a:t>
+            </a:r>
+          </a:p>
+          <a:p>
+            <a:endParaRPr lang="en-US" altLang="zh-CN" sz="1200" b="1" u="sng" dirty="0">
+              <a:solidFill>
+                <a:srgbClr val="4A4A4A"/>
+              </a:solidFill>
+              <a:latin typeface="ITC Officina Sans Std Book" panose="020B0506040203020204" pitchFamily="34" charset="0"/>
+            </a:endParaRPr>
+          </a:p>
+          <a:p>
+            <a:pPr marL="171450" indent="-171450">
+              <a:buFont typeface="Arial" panose="020B0604020202020204" pitchFamily="34" charset="0"/>
+              <a:buChar char="•"/>
+            </a:pPr>
+            <a:r>
+              <a:rPr lang="en-US" altLang="zh-CN" sz="1200" dirty="0">
+                <a:solidFill>
+                  <a:srgbClr val="4A4A4A"/>
+                </a:solidFill>
+                <a:latin typeface="ITC Officina Sans Std Book" panose="020B0506040203020204" pitchFamily="34" charset="0"/>
+              </a:rPr>
+              <a:t>The proportion of White and Asian students who meet sat math benchmark is 2.7 - 5.6 times higher than that of Hispanic and Black students.</a:t>
+            </a:r>
+          </a:p>
+          <a:p>
+            <a:pPr marL="171450" indent="-171450">
+              <a:buFont typeface="Arial" panose="020B0604020202020204" pitchFamily="34" charset="0"/>
+              <a:buChar char="•"/>
+            </a:pPr>
+            <a:endParaRPr lang="en-US" altLang="zh-CN" sz="1200" dirty="0">
+              <a:solidFill>
+                <a:srgbClr val="4A4A4A"/>
+              </a:solidFill>
+              <a:latin typeface="ITC Officina Sans Std Book" panose="020B0506040203020204" pitchFamily="34" charset="0"/>
+            </a:endParaRPr>
+          </a:p>
+          <a:p>
+            <a:pPr marL="171450" indent="-171450">
+              <a:buFont typeface="Arial" panose="020B0604020202020204" pitchFamily="34" charset="0"/>
+              <a:buChar char="•"/>
+            </a:pPr>
+            <a:r>
+              <a:rPr lang="en-US" altLang="zh-CN" sz="1200" dirty="0">
+                <a:solidFill>
+                  <a:srgbClr val="4A4A4A"/>
+                </a:solidFill>
+                <a:latin typeface="ITC Officina Sans Std Book" panose="020B0506040203020204" pitchFamily="34" charset="0"/>
+              </a:rPr>
+              <a:t>Only the White population in CPS high school perform slightly above the national average. Asian, Hispanic, and black students in CPS high school have the SAT math benchmark meeting rate 11% - 30% lower than the national average. </a:t>
+            </a:r>
+          </a:p>
+          <a:p>
+            <a:pPr marL="171450" indent="-171450">
+              <a:buFont typeface="Arial" panose="020B0604020202020204" pitchFamily="34" charset="0"/>
+              <a:buChar char="•"/>
+            </a:pPr>
+            <a:endParaRPr lang="en-US" altLang="zh-CN" sz="1200" dirty="0">
+              <a:solidFill>
+                <a:srgbClr val="4A4A4A"/>
+              </a:solidFill>
+              <a:latin typeface="ITC Officina Sans Std Book" panose="020B0506040203020204" pitchFamily="34" charset="0"/>
+            </a:endParaRPr>
+          </a:p>
+          <a:p>
+            <a:r>
+              <a:rPr lang="en-US" altLang="zh-CN" sz="1200" b="1" u="sng" dirty="0">
+                <a:solidFill>
+                  <a:srgbClr val="4A4A4A"/>
+                </a:solidFill>
+                <a:latin typeface="ITC Officina Sans Std Book" panose="020B0506040203020204" pitchFamily="34" charset="0"/>
+              </a:rPr>
+              <a:t>Takeaways</a:t>
+            </a:r>
+          </a:p>
+          <a:p>
+            <a:endParaRPr lang="en-US" altLang="zh-CN" sz="1200" b="1" u="sng" dirty="0">
+              <a:solidFill>
+                <a:srgbClr val="4A4A4A"/>
+              </a:solidFill>
+              <a:latin typeface="ITC Officina Sans Std Book" panose="020B0506040203020204" pitchFamily="34" charset="0"/>
+            </a:endParaRPr>
+          </a:p>
+          <a:p>
+            <a:pPr marL="171450" indent="-171450">
+              <a:buFont typeface="Arial" panose="020B0604020202020204" pitchFamily="34" charset="0"/>
+              <a:buChar char="•"/>
+            </a:pPr>
+            <a:r>
+              <a:rPr lang="en-US" altLang="zh-CN" sz="1200" dirty="0">
+                <a:solidFill>
+                  <a:srgbClr val="4A4A4A"/>
+                </a:solidFill>
+                <a:latin typeface="ITC Officina Sans Std Book" panose="020B0506040203020204" pitchFamily="34" charset="0"/>
+              </a:rPr>
+              <a:t>Black and Hispanic students in 4</a:t>
+            </a:r>
+            <a:r>
+              <a:rPr lang="en-US" altLang="zh-CN" sz="1200" baseline="30000" dirty="0">
+                <a:solidFill>
+                  <a:srgbClr val="4A4A4A"/>
+                </a:solidFill>
+                <a:latin typeface="ITC Officina Sans Std Book" panose="020B0506040203020204" pitchFamily="34" charset="0"/>
+              </a:rPr>
+              <a:t>th</a:t>
+            </a:r>
+            <a:r>
+              <a:rPr lang="en-US" altLang="zh-CN" sz="1200" dirty="0">
+                <a:solidFill>
+                  <a:srgbClr val="4A4A4A"/>
+                </a:solidFill>
+                <a:latin typeface="ITC Officina Sans Std Book" panose="020B0506040203020204" pitchFamily="34" charset="0"/>
+              </a:rPr>
+              <a:t> grade perform poorly in math related to Black and Hispanic on the national average.  </a:t>
+            </a:r>
+          </a:p>
+        </p:txBody>
+      </p:sp>
     </p:spTree>
     <p:extLst>
       <p:ext uri="{BB962C8B-B14F-4D97-AF65-F5344CB8AC3E}">
@@ -36748,13 +37666,13 @@
           <p:nvPr>
             <p:extLst>
               <p:ext uri="{D42A27DB-BD31-4B8C-83A1-F6EECF244321}">
-                <p14:modId xmlns:p14="http://schemas.microsoft.com/office/powerpoint/2010/main" val="3497281409"/>
+                <p14:modId xmlns:p14="http://schemas.microsoft.com/office/powerpoint/2010/main" val="4163291657"/>
               </p:ext>
             </p:extLst>
           </p:nvPr>
         </p:nvGraphicFramePr>
         <p:xfrm>
-          <a:off x="4203700" y="1474258"/>
+          <a:off x="5295900" y="2316101"/>
           <a:ext cx="5864225" cy="3909484"/>
         </p:xfrm>
         <a:graphic>
@@ -37098,10 +38016,29 @@
                 </a:solidFill>
                 <a:latin typeface="Times LT Std" panose="02020603050405020304" pitchFamily="18" charset="0"/>
               </a:rPr>
+              <a:t>Contents</a:t>
+            </a:r>
+          </a:p>
+          <a:p>
+            <a:endParaRPr lang="en-US" altLang="zh-CN" sz="4000" dirty="0">
+              <a:solidFill>
+                <a:schemeClr val="tx2"/>
+              </a:solidFill>
+              <a:latin typeface="Times LT Std" panose="02020603050405020304" pitchFamily="18" charset="0"/>
+            </a:endParaRPr>
+          </a:p>
+          <a:p>
+            <a:r>
+              <a:rPr lang="en-US" altLang="zh-CN" sz="2800" dirty="0">
+                <a:solidFill>
+                  <a:schemeClr val="tx2"/>
+                </a:solidFill>
+                <a:latin typeface="Times LT Std" panose="02020603050405020304" pitchFamily="18" charset="0"/>
+              </a:rPr>
               <a:t>2</a:t>
             </a:r>
             <a:r>
-              <a:rPr lang="en-US" altLang="zh-CN" sz="4000" baseline="30000" dirty="0">
+              <a:rPr lang="en-US" altLang="zh-CN" sz="2800" baseline="30000" dirty="0">
                 <a:solidFill>
                   <a:schemeClr val="tx2"/>
                 </a:solidFill>
@@ -37110,7 +38047,7 @@
               <a:t>nd</a:t>
             </a:r>
             <a:r>
-              <a:rPr lang="en-US" altLang="zh-CN" sz="4000" dirty="0">
+              <a:rPr lang="en-US" altLang="zh-CN" sz="2800" dirty="0">
                 <a:solidFill>
                   <a:schemeClr val="tx2"/>
                 </a:solidFill>
@@ -40148,7 +41085,7 @@
         <p:spPr>
           <a:xfrm>
             <a:off x="510556" y="386396"/>
-            <a:ext cx="11170886" cy="1231106"/>
+            <a:ext cx="11170886" cy="1508105"/>
           </a:xfrm>
           <a:prstGeom prst="rect">
             <a:avLst/>
@@ -40269,7 +41206,18 @@
                 </a:solidFill>
                 <a:latin typeface="ITC Officina Sans Std Book" panose="020B0506040203020204" pitchFamily="34" charset="0"/>
               </a:rPr>
-              <a:t>grader CHI Vs. 4</a:t>
+              <a:t>grader CHI </a:t>
+            </a:r>
+          </a:p>
+          <a:p>
+            <a:r>
+              <a:rPr lang="en-US" altLang="zh-CN" sz="1800" dirty="0">
+                <a:solidFill>
+                  <a:srgbClr val="4A4A4A"/>
+                </a:solidFill>
+                <a:latin typeface="ITC Officina Sans Std Book" panose="020B0506040203020204" pitchFamily="34" charset="0"/>
+              </a:rPr>
+              <a:t>Vs. 4</a:t>
             </a:r>
             <a:r>
               <a:rPr lang="en-US" altLang="zh-CN" sz="1800" baseline="30000" dirty="0">
@@ -40329,7 +41277,7 @@
           <p:nvPr>
             <p:extLst>
               <p:ext uri="{D42A27DB-BD31-4B8C-83A1-F6EECF244321}">
-                <p14:modId xmlns:p14="http://schemas.microsoft.com/office/powerpoint/2010/main" val="3551089760"/>
+                <p14:modId xmlns:p14="http://schemas.microsoft.com/office/powerpoint/2010/main" val="3149805467"/>
               </p:ext>
             </p:extLst>
           </p:nvPr>
@@ -40359,7 +41307,7 @@
         <p:spPr>
           <a:xfrm>
             <a:off x="581025" y="2190749"/>
-            <a:ext cx="3714750" cy="2492990"/>
+            <a:ext cx="3714750" cy="2123658"/>
           </a:xfrm>
           <a:prstGeom prst="rect">
             <a:avLst/>
@@ -40379,7 +41327,7 @@
                 </a:solidFill>
                 <a:latin typeface="ITC Officina Sans Std Book" panose="020B0506040203020204" pitchFamily="34" charset="0"/>
               </a:rPr>
-              <a:t>What does the data look like</a:t>
+              <a:t>What does the data tell?</a:t>
             </a:r>
           </a:p>
           <a:p>
@@ -40402,7 +41350,25 @@
                 </a:solidFill>
                 <a:latin typeface="ITC Officina Sans Std Book" panose="020B0506040203020204" pitchFamily="34" charset="0"/>
               </a:rPr>
-              <a:t>White students have the highest math proficiency rate,1.1 times higher than Asians, 1.8 times higher than Hispanics, and 2.8 times higher than black. </a:t>
+              <a:t>In CPS 4</a:t>
+            </a:r>
+            <a:r>
+              <a:rPr lang="en-US" altLang="zh-CN" sz="1200" baseline="30000" dirty="0">
+                <a:solidFill>
+                  <a:srgbClr val="4A4A4A"/>
+                </a:solidFill>
+                <a:latin typeface="ITC Officina Sans Std Book" panose="020B0506040203020204" pitchFamily="34" charset="0"/>
+              </a:rPr>
+              <a:t>th</a:t>
+            </a:r>
+            <a:r>
+              <a:rPr lang="en-US" altLang="zh-CN" sz="1200" dirty="0">
+                <a:solidFill>
+                  <a:srgbClr val="4A4A4A"/>
+                </a:solidFill>
+                <a:latin typeface="ITC Officina Sans Std Book" panose="020B0506040203020204" pitchFamily="34" charset="0"/>
+              </a:rPr>
+              <a:t> grade, White students have the highest math proficiency rate,1.1 times higher than Asians, 1.8 times higher than Hispanics, and 2.8 times higher than black. </a:t>
             </a:r>
           </a:p>
           <a:p>
@@ -40429,50 +41395,28 @@
                 </a:solidFill>
                 <a:latin typeface="ITC Officina Sans Std Book" panose="020B0506040203020204" pitchFamily="34" charset="0"/>
               </a:rPr>
-              <a:t>A smaller proportion of 4th graders is proficient at math across all ethnic groups in CPS than the national average. </a:t>
+              <a:t>The proportion of math proficient students in 4</a:t>
             </a:r>
-          </a:p>
-          <a:p>
-            <a:endParaRPr lang="en-US" altLang="zh-CN" sz="1200" dirty="0">
-              <a:solidFill>
-                <a:srgbClr val="4A4A4A"/>
-              </a:solidFill>
-              <a:latin typeface="ITC Officina Sans Std Book" panose="020B0506040203020204" pitchFamily="34" charset="0"/>
-            </a:endParaRPr>
-          </a:p>
-          <a:p>
             <a:r>
-              <a:rPr lang="en-US" altLang="zh-CN" sz="1200" b="1" u="sng" dirty="0">
+              <a:rPr lang="en-US" altLang="zh-CN" sz="1200" baseline="30000" dirty="0">
                 <a:solidFill>
                   <a:srgbClr val="4A4A4A"/>
                 </a:solidFill>
                 <a:latin typeface="ITC Officina Sans Std Book" panose="020B0506040203020204" pitchFamily="34" charset="0"/>
               </a:rPr>
-              <a:t>Takeaways</a:t>
+              <a:t>th</a:t>
             </a:r>
-          </a:p>
-          <a:p>
-            <a:endParaRPr lang="en-US" altLang="zh-CN" sz="1200" b="1" u="sng" dirty="0">
-              <a:solidFill>
-                <a:srgbClr val="4A4A4A"/>
-              </a:solidFill>
-              <a:latin typeface="ITC Officina Sans Std Book" panose="020B0506040203020204" pitchFamily="34" charset="0"/>
-            </a:endParaRPr>
-          </a:p>
-          <a:p>
-            <a:pPr marL="171450" indent="-171450">
-              <a:buFont typeface="Arial" panose="020B0604020202020204" pitchFamily="34" charset="0"/>
-              <a:buChar char="•"/>
-            </a:pPr>
             <a:r>
-              <a:rPr lang="en-US" altLang="zh-CN" sz="1200" dirty="0" err="1">
+              <a:rPr lang="en-US" altLang="zh-CN" sz="1200" dirty="0">
                 <a:solidFill>
                   <a:srgbClr val="4A4A4A"/>
                 </a:solidFill>
                 <a:latin typeface="ITC Officina Sans Std Book" panose="020B0506040203020204" pitchFamily="34" charset="0"/>
               </a:rPr>
-              <a:t>qq</a:t>
+              <a:t> grade is noticeably lower in CPS than the national average across all ethnic groups. </a:t>
             </a:r>
+          </a:p>
+          <a:p>
             <a:endParaRPr lang="en-US" altLang="zh-CN" sz="1200" dirty="0">
               <a:solidFill>
                 <a:srgbClr val="4A4A4A"/>
@@ -40574,7 +41518,7 @@
         <p:spPr>
           <a:xfrm>
             <a:off x="510556" y="386396"/>
-            <a:ext cx="11170886" cy="1231106"/>
+            <a:ext cx="11170886" cy="1785104"/>
           </a:xfrm>
           <a:prstGeom prst="rect">
             <a:avLst/>
@@ -40644,6 +41588,14 @@
             </a:r>
           </a:p>
           <a:p>
+            <a:endParaRPr lang="en-US" altLang="zh-CN" sz="1800" dirty="0">
+              <a:solidFill>
+                <a:srgbClr val="4A4A4A"/>
+              </a:solidFill>
+              <a:latin typeface="ITC Officina Sans Std Book" panose="020B0506040203020204" pitchFamily="34" charset="0"/>
+            </a:endParaRPr>
+          </a:p>
+          <a:p>
             <a:r>
               <a:rPr lang="en-US" altLang="zh-CN" sz="1800" dirty="0">
                 <a:solidFill>
@@ -40687,7 +41639,18 @@
                 </a:solidFill>
                 <a:latin typeface="ITC Officina Sans Std Book" panose="020B0506040203020204" pitchFamily="34" charset="0"/>
               </a:rPr>
-              <a:t>grader CHI Vs. 8</a:t>
+              <a:t>grader CHI </a:t>
+            </a:r>
+          </a:p>
+          <a:p>
+            <a:r>
+              <a:rPr lang="en-US" altLang="zh-CN" sz="1800" dirty="0">
+                <a:solidFill>
+                  <a:srgbClr val="4A4A4A"/>
+                </a:solidFill>
+                <a:latin typeface="ITC Officina Sans Std Book" panose="020B0506040203020204" pitchFamily="34" charset="0"/>
+              </a:rPr>
+              <a:t>Vs. 8</a:t>
             </a:r>
             <a:r>
               <a:rPr lang="en-US" altLang="zh-CN" sz="1800" baseline="30000" dirty="0">
@@ -40749,7 +41712,7 @@
           <p:nvPr>
             <p:extLst>
               <p:ext uri="{D42A27DB-BD31-4B8C-83A1-F6EECF244321}">
-                <p14:modId xmlns:p14="http://schemas.microsoft.com/office/powerpoint/2010/main" val="3420234535"/>
+                <p14:modId xmlns:p14="http://schemas.microsoft.com/office/powerpoint/2010/main" val="3790736728"/>
               </p:ext>
             </p:extLst>
           </p:nvPr>
@@ -40766,10 +41729,10 @@
       </p:graphicFrame>
       <p:sp>
         <p:nvSpPr>
-          <p:cNvPr id="6" name="TextBox 5">
+          <p:cNvPr id="7" name="TextBox 6">
             <a:extLst>
               <a:ext uri="{FF2B5EF4-FFF2-40B4-BE49-F238E27FC236}">
-                <a16:creationId xmlns:a16="http://schemas.microsoft.com/office/drawing/2014/main" id="{54E30157-2BD0-15DC-2686-AD2C7B383B53}"/>
+                <a16:creationId xmlns:a16="http://schemas.microsoft.com/office/drawing/2014/main" id="{FF29EFFA-9A14-5612-5F73-22D7F65B605C}"/>
               </a:ext>
             </a:extLst>
           </p:cNvPr>
@@ -40778,8 +41741,8 @@
         </p:nvSpPr>
         <p:spPr>
           <a:xfrm>
-            <a:off x="581025" y="2863244"/>
-            <a:ext cx="3714750" cy="2492990"/>
+            <a:off x="581025" y="2190749"/>
+            <a:ext cx="3714750" cy="3046988"/>
           </a:xfrm>
           <a:prstGeom prst="rect">
             <a:avLst/>
@@ -40792,6 +41755,25 @@
           </a:bodyPr>
           <a:lstStyle/>
           <a:p>
+            <a:r>
+              <a:rPr lang="en-US" altLang="zh-CN" sz="1200" b="1" u="sng" dirty="0">
+                <a:solidFill>
+                  <a:srgbClr val="4A4A4A"/>
+                </a:solidFill>
+                <a:latin typeface="ITC Officina Sans Std Book" panose="020B0506040203020204" pitchFamily="34" charset="0"/>
+              </a:rPr>
+              <a:t>What does the data tell?</a:t>
+            </a:r>
+          </a:p>
+          <a:p>
+            <a:endParaRPr lang="en-US" altLang="zh-CN" sz="1200" b="1" u="sng" dirty="0">
+              <a:solidFill>
+                <a:srgbClr val="4A4A4A"/>
+              </a:solidFill>
+              <a:latin typeface="ITC Officina Sans Std Book" panose="020B0506040203020204" pitchFamily="34" charset="0"/>
+            </a:endParaRPr>
+          </a:p>
+          <a:p>
             <a:pPr marL="171450" indent="-171450">
               <a:buFont typeface="Arial" panose="020B0604020202020204" pitchFamily="34" charset="0"/>
               <a:buChar char="•"/>
@@ -40803,7 +41785,25 @@
                 </a:solidFill>
                 <a:latin typeface="ITC Officina Sans Std Book" panose="020B0506040203020204" pitchFamily="34" charset="0"/>
               </a:rPr>
-              <a:t>A smaller proportion of 4th graders is proficient at math across all ethnic groups in CPS than the national average. </a:t>
+              <a:t>In CPS 8</a:t>
+            </a:r>
+            <a:r>
+              <a:rPr lang="en-US" altLang="zh-CN" sz="1200" baseline="30000" dirty="0">
+                <a:solidFill>
+                  <a:srgbClr val="4A4A4A"/>
+                </a:solidFill>
+                <a:latin typeface="ITC Officina Sans Std Book" panose="020B0506040203020204" pitchFamily="34" charset="0"/>
+              </a:rPr>
+              <a:t>th</a:t>
+            </a:r>
+            <a:r>
+              <a:rPr lang="en-US" altLang="zh-CN" sz="1200" dirty="0">
+                <a:solidFill>
+                  <a:srgbClr val="4A4A4A"/>
+                </a:solidFill>
+                <a:latin typeface="ITC Officina Sans Std Book" panose="020B0506040203020204" pitchFamily="34" charset="0"/>
+              </a:rPr>
+              <a:t> grade, Asian and White students have the highest math proficiency rate, 1.6 times higher than Hispanics, and 2.6 times higher than black. </a:t>
             </a:r>
           </a:p>
           <a:p>
@@ -40830,15 +41830,48 @@
                 </a:solidFill>
                 <a:latin typeface="ITC Officina Sans Std Book" panose="020B0506040203020204" pitchFamily="34" charset="0"/>
               </a:rPr>
-              <a:t>The proportion of math proficiency for Asians is 30%  lower than the national average. </a:t>
+              <a:t>In the 8</a:t>
+            </a:r>
+            <a:r>
+              <a:rPr lang="en-US" altLang="zh-CN" sz="1200" baseline="30000" dirty="0">
+                <a:solidFill>
+                  <a:srgbClr val="4A4A4A"/>
+                </a:solidFill>
+                <a:latin typeface="ITC Officina Sans Std Book" panose="020B0506040203020204" pitchFamily="34" charset="0"/>
+              </a:rPr>
+              <a:t>th</a:t>
+            </a:r>
+            <a:r>
+              <a:rPr lang="en-US" altLang="zh-CN" sz="1200" dirty="0">
+                <a:solidFill>
+                  <a:srgbClr val="4A4A4A"/>
+                </a:solidFill>
+                <a:latin typeface="ITC Officina Sans Std Book" panose="020B0506040203020204" pitchFamily="34" charset="0"/>
+              </a:rPr>
+              <a:t> grade, in relation to the national average, White and Asians have significantly lower math proficiency rates, while that of Black and Hispanics is slightly higher. </a:t>
             </a:r>
           </a:p>
           <a:p>
-            <a:pPr marL="171450" indent="-171450">
-              <a:buFont typeface="Arial" panose="020B0604020202020204" pitchFamily="34" charset="0"/>
-              <a:buChar char="•"/>
-            </a:pPr>
             <a:endParaRPr lang="en-US" altLang="zh-CN" sz="1200" dirty="0">
+              <a:solidFill>
+                <a:srgbClr val="4A4A4A"/>
+              </a:solidFill>
+              <a:latin typeface="ITC Officina Sans Std Book" panose="020B0506040203020204" pitchFamily="34" charset="0"/>
+            </a:endParaRPr>
+          </a:p>
+          <a:p>
+            <a:r>
+              <a:rPr lang="en-US" altLang="zh-CN" sz="1200" b="1" u="sng" dirty="0">
+                <a:solidFill>
+                  <a:srgbClr val="4A4A4A"/>
+                </a:solidFill>
+                <a:latin typeface="ITC Officina Sans Std Book" panose="020B0506040203020204" pitchFamily="34" charset="0"/>
+              </a:rPr>
+              <a:t>Takeaways</a:t>
+            </a:r>
+          </a:p>
+          <a:p>
+            <a:endParaRPr lang="en-US" altLang="zh-CN" sz="1200" b="1" u="sng" dirty="0">
               <a:solidFill>
                 <a:srgbClr val="4A4A4A"/>
               </a:solidFill>
@@ -40857,18 +41890,8 @@
                 </a:solidFill>
                 <a:latin typeface="ITC Officina Sans Std Book" panose="020B0506040203020204" pitchFamily="34" charset="0"/>
               </a:rPr>
-              <a:t>White students have the highest math proficiency rate,1.1 times higher than Asians, 2.8 times higher than black, and 1.8 times higher than Hispanics. </a:t>
+              <a:t>Using the national average as a benchmark, the math proficiency rate</a:t>
             </a:r>
-          </a:p>
-          <a:p>
-            <a:endParaRPr lang="en-US" altLang="zh-CN" sz="1200" dirty="0">
-              <a:solidFill>
-                <a:srgbClr val="4A4A4A"/>
-              </a:solidFill>
-              <a:latin typeface="ITC Officina Sans Std Book" panose="020B0506040203020204" pitchFamily="34" charset="0"/>
-            </a:endParaRPr>
-          </a:p>
-          <a:p>
             <a:r>
               <a:rPr lang="zh-CN" altLang="en-US" sz="1200" dirty="0">
                 <a:solidFill>
@@ -40876,7 +41899,7 @@
                 </a:solidFill>
                 <a:latin typeface="ITC Officina Sans Std Book" panose="020B0506040203020204" pitchFamily="34" charset="0"/>
               </a:rPr>
-              <a:t>* </a:t>
+              <a:t> </a:t>
             </a:r>
             <a:r>
               <a:rPr lang="en-US" altLang="zh-CN" sz="1200" dirty="0">
@@ -40885,14 +41908,62 @@
                 </a:solidFill>
                 <a:latin typeface="ITC Officina Sans Std Book" panose="020B0506040203020204" pitchFamily="34" charset="0"/>
               </a:rPr>
-              <a:t>The estimation of national averages used data of both private and public-school.</a:t>
+              <a:t>of</a:t>
             </a:r>
-            <a:endParaRPr lang="zh-CN" altLang="en-US" sz="1200" dirty="0">
-              <a:solidFill>
-                <a:srgbClr val="4A4A4A"/>
-              </a:solidFill>
-              <a:latin typeface="ITC Officina Sans Std Book" panose="020B0506040203020204" pitchFamily="34" charset="0"/>
-            </a:endParaRPr>
+            <a:r>
+              <a:rPr lang="zh-CN" altLang="en-US" sz="1200" dirty="0">
+                <a:solidFill>
+                  <a:srgbClr val="4A4A4A"/>
+                </a:solidFill>
+                <a:latin typeface="ITC Officina Sans Std Book" panose="020B0506040203020204" pitchFamily="34" charset="0"/>
+              </a:rPr>
+              <a:t> </a:t>
+            </a:r>
+            <a:r>
+              <a:rPr lang="en-US" altLang="zh-CN" sz="1200" dirty="0">
+                <a:solidFill>
+                  <a:srgbClr val="4A4A4A"/>
+                </a:solidFill>
+                <a:latin typeface="ITC Officina Sans Std Book" panose="020B0506040203020204" pitchFamily="34" charset="0"/>
+              </a:rPr>
+              <a:t>Black and Hispanic students in CPS  improved from 4</a:t>
+            </a:r>
+            <a:r>
+              <a:rPr lang="en-US" altLang="zh-CN" sz="1200" baseline="30000" dirty="0">
+                <a:solidFill>
+                  <a:srgbClr val="4A4A4A"/>
+                </a:solidFill>
+                <a:latin typeface="ITC Officina Sans Std Book" panose="020B0506040203020204" pitchFamily="34" charset="0"/>
+              </a:rPr>
+              <a:t>th</a:t>
+            </a:r>
+            <a:r>
+              <a:rPr lang="en-US" altLang="zh-CN" sz="1200" dirty="0">
+                <a:solidFill>
+                  <a:srgbClr val="4A4A4A"/>
+                </a:solidFill>
+                <a:latin typeface="ITC Officina Sans Std Book" panose="020B0506040203020204" pitchFamily="34" charset="0"/>
+              </a:rPr>
+              <a:t> to 8</a:t>
+            </a:r>
+            <a:r>
+              <a:rPr lang="en-US" altLang="zh-CN" sz="1200" baseline="30000" dirty="0">
+                <a:solidFill>
+                  <a:srgbClr val="4A4A4A"/>
+                </a:solidFill>
+                <a:latin typeface="ITC Officina Sans Std Book" panose="020B0506040203020204" pitchFamily="34" charset="0"/>
+              </a:rPr>
+              <a:t>th</a:t>
+            </a:r>
+            <a:r>
+              <a:rPr lang="en-US" altLang="zh-CN" sz="1200" dirty="0">
+                <a:solidFill>
+                  <a:srgbClr val="4A4A4A"/>
+                </a:solidFill>
+                <a:latin typeface="ITC Officina Sans Std Book" panose="020B0506040203020204" pitchFamily="34" charset="0"/>
+              </a:rPr>
+              <a:t> grades.</a:t>
+            </a:r>
           </a:p>
         </p:txBody>
       </p:sp>
@@ -40988,7 +42059,7 @@
         <p:spPr>
           <a:xfrm>
             <a:off x="510556" y="386396"/>
-            <a:ext cx="11170886" cy="677108"/>
+            <a:ext cx="11170886" cy="1785104"/>
           </a:xfrm>
           <a:prstGeom prst="rect">
             <a:avLst/>
@@ -41054,47 +42125,20 @@
                 </a:solidFill>
                 <a:latin typeface="ITC Officina Sans Std Book" panose="020B0506040203020204" pitchFamily="34" charset="0"/>
               </a:rPr>
-              <a:t>The proportion of CPS 8th graders passing algebra by race/ethnicity</a:t>
+              <a:t>The proportion of CPS 8th graders enrolled in algebra classes passing algebra by race/ethnicity</a:t>
             </a:r>
-            <a:endParaRPr lang="zh-CN" altLang="en-US" dirty="0">
+          </a:p>
+          <a:p>
+            <a:endParaRPr lang="en-US" altLang="zh-CN" dirty="0">
               <a:solidFill>
                 <a:srgbClr val="4A4A4A"/>
               </a:solidFill>
               <a:latin typeface="ITC Officina Sans Std Book" panose="020B0506040203020204" pitchFamily="34" charset="0"/>
             </a:endParaRPr>
           </a:p>
-        </p:txBody>
-      </p:sp>
-      <p:sp>
-        <p:nvSpPr>
-          <p:cNvPr id="5" name="TextBox 4">
-            <a:extLst>
-              <a:ext uri="{FF2B5EF4-FFF2-40B4-BE49-F238E27FC236}">
-                <a16:creationId xmlns:a16="http://schemas.microsoft.com/office/drawing/2014/main" id="{A9CCA89F-D073-402F-0C30-8AB6E2C26584}"/>
-              </a:ext>
-            </a:extLst>
-          </p:cNvPr>
-          <p:cNvSpPr txBox="1"/>
-          <p:nvPr/>
-        </p:nvSpPr>
-        <p:spPr>
-          <a:xfrm>
-            <a:off x="510556" y="2976666"/>
-            <a:ext cx="3401044" cy="646331"/>
-          </a:xfrm>
-          <a:prstGeom prst="rect">
-            <a:avLst/>
-          </a:prstGeom>
-          <a:noFill/>
-        </p:spPr>
-        <p:txBody>
-          <a:bodyPr wrap="square" rtlCol="0">
-            <a:spAutoFit/>
-          </a:bodyPr>
-          <a:lstStyle/>
           <a:p>
             <a:r>
-              <a:rPr lang="en-US" altLang="zh-CN" sz="1200" dirty="0">
+              <a:rPr lang="en-US" altLang="zh-CN" dirty="0">
                 <a:solidFill>
                   <a:srgbClr val="4A4A4A"/>
                 </a:solidFill>
@@ -41103,7 +42147,7 @@
               <a:t>8</a:t>
             </a:r>
             <a:r>
-              <a:rPr lang="en-US" altLang="zh-CN" sz="1200" baseline="30000" dirty="0">
+              <a:rPr lang="en-US" altLang="zh-CN" baseline="30000" dirty="0">
                 <a:solidFill>
                   <a:srgbClr val="4A4A4A"/>
                 </a:solidFill>
@@ -41112,16 +42156,16 @@
               <a:t>th </a:t>
             </a:r>
             <a:r>
-              <a:rPr lang="en-US" altLang="zh-CN" sz="1200" dirty="0">
+              <a:rPr lang="en-US" altLang="zh-CN" dirty="0">
                 <a:solidFill>
                   <a:srgbClr val="4A4A4A"/>
                 </a:solidFill>
                 <a:latin typeface="ITC Officina Sans Std Book" panose="020B0506040203020204" pitchFamily="34" charset="0"/>
               </a:rPr>
-              <a:t>grader passing algebra CHI / Total 8</a:t>
+              <a:t>grader passing algebra CHI / 8</a:t>
             </a:r>
             <a:r>
-              <a:rPr lang="en-US" altLang="zh-CN" sz="1200" baseline="30000" dirty="0">
+              <a:rPr lang="en-US" altLang="zh-CN" baseline="30000" dirty="0">
                 <a:solidFill>
                   <a:srgbClr val="4A4A4A"/>
                 </a:solidFill>
@@ -41130,38 +42174,27 @@
               <a:t>th </a:t>
             </a:r>
             <a:r>
-              <a:rPr lang="en-US" altLang="zh-CN" sz="1200" dirty="0">
+              <a:rPr lang="en-US" altLang="zh-CN" dirty="0">
                 <a:solidFill>
                   <a:srgbClr val="4A4A4A"/>
                 </a:solidFill>
                 <a:latin typeface="ITC Officina Sans Std Book" panose="020B0506040203020204" pitchFamily="34" charset="0"/>
               </a:rPr>
-              <a:t>grader CHI</a:t>
+              <a:t>graders enrolled in algebra CHI </a:t>
             </a:r>
           </a:p>
           <a:p>
             <a:r>
-              <a:rPr lang="en-US" altLang="zh-CN" sz="1200" dirty="0">
+              <a:rPr lang="en-US" altLang="zh-CN" dirty="0">
                 <a:solidFill>
                   <a:srgbClr val="4A4A4A"/>
                 </a:solidFill>
                 <a:latin typeface="ITC Officina Sans Std Book" panose="020B0506040203020204" pitchFamily="34" charset="0"/>
               </a:rPr>
-              <a:t>Vs. </a:t>
-            </a:r>
-          </a:p>
-          <a:p>
-            <a:r>
-              <a:rPr lang="en-US" altLang="zh-CN" sz="1200" dirty="0">
-                <a:solidFill>
-                  <a:srgbClr val="4A4A4A"/>
-                </a:solidFill>
-                <a:latin typeface="ITC Officina Sans Std Book" panose="020B0506040203020204" pitchFamily="34" charset="0"/>
-              </a:rPr>
-              <a:t>8</a:t>
+              <a:t>Vs. 8</a:t>
             </a:r>
             <a:r>
-              <a:rPr lang="en-US" altLang="zh-CN" sz="1200" baseline="30000" dirty="0">
+              <a:rPr lang="en-US" altLang="zh-CN" baseline="30000" dirty="0">
                 <a:solidFill>
                   <a:srgbClr val="4A4A4A"/>
                 </a:solidFill>
@@ -41170,16 +42203,16 @@
               <a:t>th </a:t>
             </a:r>
             <a:r>
-              <a:rPr lang="en-US" altLang="zh-CN" sz="1200" dirty="0">
+              <a:rPr lang="en-US" altLang="zh-CN" dirty="0">
                 <a:solidFill>
                   <a:srgbClr val="4A4A4A"/>
                 </a:solidFill>
                 <a:latin typeface="ITC Officina Sans Std Book" panose="020B0506040203020204" pitchFamily="34" charset="0"/>
               </a:rPr>
-              <a:t>grader passing algebra US / Total 8</a:t>
+              <a:t>grader passing algebra US / 8</a:t>
             </a:r>
             <a:r>
-              <a:rPr lang="en-US" altLang="zh-CN" sz="1200" baseline="30000" dirty="0">
+              <a:rPr lang="en-US" altLang="zh-CN" baseline="30000" dirty="0">
                 <a:solidFill>
                   <a:srgbClr val="4A4A4A"/>
                 </a:solidFill>
@@ -41188,14 +42221,22 @@
               <a:t>th </a:t>
             </a:r>
             <a:r>
-              <a:rPr lang="en-US" altLang="zh-CN" sz="1200" dirty="0">
+              <a:rPr lang="en-US" altLang="zh-CN" dirty="0">
                 <a:solidFill>
                   <a:srgbClr val="4A4A4A"/>
                 </a:solidFill>
                 <a:latin typeface="ITC Officina Sans Std Book" panose="020B0506040203020204" pitchFamily="34" charset="0"/>
               </a:rPr>
-              <a:t>grader US</a:t>
+              <a:t>graders enrolled in algebra US</a:t>
             </a:r>
+          </a:p>
+          <a:p>
+            <a:endParaRPr lang="zh-CN" altLang="en-US" dirty="0">
+              <a:solidFill>
+                <a:srgbClr val="4A4A4A"/>
+              </a:solidFill>
+              <a:latin typeface="ITC Officina Sans Std Book" panose="020B0506040203020204" pitchFamily="34" charset="0"/>
+            </a:endParaRPr>
           </a:p>
         </p:txBody>
       </p:sp>
@@ -41212,14 +42253,14 @@
           <p:nvPr>
             <p:extLst>
               <p:ext uri="{D42A27DB-BD31-4B8C-83A1-F6EECF244321}">
-                <p14:modId xmlns:p14="http://schemas.microsoft.com/office/powerpoint/2010/main" val="691725479"/>
+                <p14:modId xmlns:p14="http://schemas.microsoft.com/office/powerpoint/2010/main" val="478264951"/>
               </p:ext>
             </p:extLst>
           </p:nvPr>
         </p:nvGraphicFramePr>
         <p:xfrm>
           <a:off x="5102227" y="2191808"/>
-          <a:ext cx="6654798" cy="4128347"/>
+          <a:ext cx="6105035" cy="4279796"/>
         </p:xfrm>
         <a:graphic>
           <a:graphicData uri="http://schemas.openxmlformats.org/drawingml/2006/chart">
@@ -41227,6 +42268,142 @@
           </a:graphicData>
         </a:graphic>
       </p:graphicFrame>
+      <p:sp>
+        <p:nvSpPr>
+          <p:cNvPr id="6" name="TextBox 5">
+            <a:extLst>
+              <a:ext uri="{FF2B5EF4-FFF2-40B4-BE49-F238E27FC236}">
+                <a16:creationId xmlns:a16="http://schemas.microsoft.com/office/drawing/2014/main" id="{E7EB357B-DC3F-741B-737F-0734403E4940}"/>
+              </a:ext>
+            </a:extLst>
+          </p:cNvPr>
+          <p:cNvSpPr txBox="1"/>
+          <p:nvPr/>
+        </p:nvSpPr>
+        <p:spPr>
+          <a:xfrm>
+            <a:off x="581025" y="2190749"/>
+            <a:ext cx="3714750" cy="2123658"/>
+          </a:xfrm>
+          <a:prstGeom prst="rect">
+            <a:avLst/>
+          </a:prstGeom>
+          <a:noFill/>
+        </p:spPr>
+        <p:txBody>
+          <a:bodyPr wrap="square" rtlCol="0">
+            <a:spAutoFit/>
+          </a:bodyPr>
+          <a:lstStyle/>
+          <a:p>
+            <a:r>
+              <a:rPr lang="en-US" altLang="zh-CN" sz="1200" b="1" u="sng" dirty="0">
+                <a:solidFill>
+                  <a:srgbClr val="4A4A4A"/>
+                </a:solidFill>
+                <a:latin typeface="ITC Officina Sans Std Book" panose="020B0506040203020204" pitchFamily="34" charset="0"/>
+              </a:rPr>
+              <a:t>What does the data tell?</a:t>
+            </a:r>
+          </a:p>
+          <a:p>
+            <a:endParaRPr lang="en-US" altLang="zh-CN" sz="1200" b="1" u="sng" dirty="0">
+              <a:solidFill>
+                <a:srgbClr val="4A4A4A"/>
+              </a:solidFill>
+              <a:latin typeface="ITC Officina Sans Std Book" panose="020B0506040203020204" pitchFamily="34" charset="0"/>
+            </a:endParaRPr>
+          </a:p>
+          <a:p>
+            <a:pPr marL="171450" indent="-171450">
+              <a:buFont typeface="Arial" panose="020B0604020202020204" pitchFamily="34" charset="0"/>
+              <a:buChar char="•"/>
+            </a:pPr>
+            <a:r>
+              <a:rPr lang="en-US" altLang="zh-CN" sz="1200" dirty="0">
+                <a:solidFill>
+                  <a:srgbClr val="4A4A4A"/>
+                </a:solidFill>
+                <a:latin typeface="ITC Officina Sans Std Book" panose="020B0506040203020204" pitchFamily="34" charset="0"/>
+              </a:rPr>
+              <a:t>The algebra passing rate in CPS is greater than 95% across all ethnic groups, significantly higher than the national average. </a:t>
+            </a:r>
+          </a:p>
+          <a:p>
+            <a:pPr marL="171450" indent="-171450">
+              <a:buFont typeface="Arial" panose="020B0604020202020204" pitchFamily="34" charset="0"/>
+              <a:buChar char="•"/>
+            </a:pPr>
+            <a:endParaRPr lang="en-US" altLang="zh-CN" sz="1200" dirty="0">
+              <a:solidFill>
+                <a:srgbClr val="4A4A4A"/>
+              </a:solidFill>
+              <a:latin typeface="ITC Officina Sans Std Book" panose="020B0506040203020204" pitchFamily="34" charset="0"/>
+            </a:endParaRPr>
+          </a:p>
+          <a:p>
+            <a:pPr marL="171450" indent="-171450">
+              <a:buFont typeface="Arial" panose="020B0604020202020204" pitchFamily="34" charset="0"/>
+              <a:buChar char="•"/>
+            </a:pPr>
+            <a:r>
+              <a:rPr lang="en-US" altLang="zh-CN" sz="1200" dirty="0">
+                <a:solidFill>
+                  <a:srgbClr val="4A4A4A"/>
+                </a:solidFill>
+                <a:latin typeface="ITC Officina Sans Std Book" panose="020B0506040203020204" pitchFamily="34" charset="0"/>
+              </a:rPr>
+              <a:t>Minor inequality detected in this metric </a:t>
+            </a:r>
+          </a:p>
+          <a:p>
+            <a:pPr marL="171450" indent="-171450">
+              <a:buFont typeface="Arial" panose="020B0604020202020204" pitchFamily="34" charset="0"/>
+              <a:buChar char="•"/>
+            </a:pPr>
+            <a:endParaRPr lang="en-US" altLang="zh-CN" sz="1200" dirty="0">
+              <a:solidFill>
+                <a:srgbClr val="4A4A4A"/>
+              </a:solidFill>
+              <a:latin typeface="ITC Officina Sans Std Book" panose="020B0506040203020204" pitchFamily="34" charset="0"/>
+            </a:endParaRPr>
+          </a:p>
+          <a:p>
+            <a:r>
+              <a:rPr lang="en-US" altLang="zh-CN" sz="1200" b="1" u="sng" dirty="0">
+                <a:solidFill>
+                  <a:srgbClr val="4A4A4A"/>
+                </a:solidFill>
+                <a:latin typeface="ITC Officina Sans Std Book" panose="020B0506040203020204" pitchFamily="34" charset="0"/>
+              </a:rPr>
+              <a:t>Takeaways</a:t>
+            </a:r>
+          </a:p>
+          <a:p>
+            <a:endParaRPr lang="en-US" altLang="zh-CN" sz="1200" b="1" u="sng" dirty="0">
+              <a:solidFill>
+                <a:srgbClr val="4A4A4A"/>
+              </a:solidFill>
+              <a:latin typeface="ITC Officina Sans Std Book" panose="020B0506040203020204" pitchFamily="34" charset="0"/>
+            </a:endParaRPr>
+          </a:p>
+          <a:p>
+            <a:pPr marL="171450" indent="-171450">
+              <a:buFont typeface="Arial" panose="020B0604020202020204" pitchFamily="34" charset="0"/>
+              <a:buChar char="•"/>
+            </a:pPr>
+            <a:r>
+              <a:rPr lang="en-US" altLang="zh-CN" sz="1200" dirty="0">
+                <a:solidFill>
+                  <a:srgbClr val="4A4A4A"/>
+                </a:solidFill>
+                <a:latin typeface="ITC Officina Sans Std Book" panose="020B0506040203020204" pitchFamily="34" charset="0"/>
+              </a:rPr>
+              <a:t>Great performance of CPS algebra class</a:t>
+            </a:r>
+          </a:p>
+        </p:txBody>
+      </p:sp>
     </p:spTree>
     <p:extLst>
       <p:ext uri="{BB962C8B-B14F-4D97-AF65-F5344CB8AC3E}">
@@ -41319,7 +42496,7 @@
         <p:spPr>
           <a:xfrm>
             <a:off x="510556" y="386396"/>
-            <a:ext cx="11170886" cy="677108"/>
+            <a:ext cx="11170886" cy="1785104"/>
           </a:xfrm>
           <a:prstGeom prst="rect">
             <a:avLst/>
@@ -41387,45 +42564,18 @@
               </a:rPr>
               <a:t>The proportion of CPS 4th graders advanced in math by race/ethnicity</a:t>
             </a:r>
-            <a:endParaRPr lang="zh-CN" altLang="en-US" dirty="0">
+          </a:p>
+          <a:p>
+            <a:endParaRPr lang="en-US" altLang="zh-CN" dirty="0">
               <a:solidFill>
                 <a:srgbClr val="4A4A4A"/>
               </a:solidFill>
               <a:latin typeface="ITC Officina Sans Std Book" panose="020B0506040203020204" pitchFamily="34" charset="0"/>
             </a:endParaRPr>
           </a:p>
-        </p:txBody>
-      </p:sp>
-      <p:sp>
-        <p:nvSpPr>
-          <p:cNvPr id="5" name="TextBox 4">
-            <a:extLst>
-              <a:ext uri="{FF2B5EF4-FFF2-40B4-BE49-F238E27FC236}">
-                <a16:creationId xmlns:a16="http://schemas.microsoft.com/office/drawing/2014/main" id="{B843ABCC-D4D4-EE48-37E8-1D5E24F44842}"/>
-              </a:ext>
-            </a:extLst>
-          </p:cNvPr>
-          <p:cNvSpPr txBox="1"/>
-          <p:nvPr/>
-        </p:nvSpPr>
-        <p:spPr>
-          <a:xfrm>
-            <a:off x="510556" y="2967335"/>
-            <a:ext cx="3401044" cy="646331"/>
-          </a:xfrm>
-          <a:prstGeom prst="rect">
-            <a:avLst/>
-          </a:prstGeom>
-          <a:noFill/>
-        </p:spPr>
-        <p:txBody>
-          <a:bodyPr wrap="square" rtlCol="0">
-            <a:spAutoFit/>
-          </a:bodyPr>
-          <a:lstStyle/>
           <a:p>
             <a:r>
-              <a:rPr lang="en-US" altLang="zh-CN" sz="1200" dirty="0">
+              <a:rPr lang="en-US" altLang="zh-CN" sz="1800" dirty="0">
                 <a:solidFill>
                   <a:srgbClr val="4A4A4A"/>
                 </a:solidFill>
@@ -41434,7 +42584,7 @@
               <a:t>4</a:t>
             </a:r>
             <a:r>
-              <a:rPr lang="en-US" altLang="zh-CN" sz="1200" baseline="30000" dirty="0">
+              <a:rPr lang="en-US" altLang="zh-CN" sz="1800" baseline="30000" dirty="0">
                 <a:solidFill>
                   <a:srgbClr val="4A4A4A"/>
                 </a:solidFill>
@@ -41443,7 +42593,7 @@
               <a:t>th </a:t>
             </a:r>
             <a:r>
-              <a:rPr lang="en-US" altLang="zh-CN" sz="1200" dirty="0">
+              <a:rPr lang="en-US" altLang="zh-CN" sz="1800" dirty="0">
                 <a:solidFill>
                   <a:srgbClr val="4A4A4A"/>
                 </a:solidFill>
@@ -41452,7 +42602,7 @@
               <a:t>grader math advanced CHI / Total 4</a:t>
             </a:r>
             <a:r>
-              <a:rPr lang="en-US" altLang="zh-CN" sz="1200" baseline="30000" dirty="0">
+              <a:rPr lang="en-US" altLang="zh-CN" sz="1800" baseline="30000" dirty="0">
                 <a:solidFill>
                   <a:srgbClr val="4A4A4A"/>
                 </a:solidFill>
@@ -41461,7 +42611,7 @@
               <a:t>th </a:t>
             </a:r>
             <a:r>
-              <a:rPr lang="en-US" altLang="zh-CN" sz="1200" dirty="0">
+              <a:rPr lang="en-US" altLang="zh-CN" sz="1800" dirty="0">
                 <a:solidFill>
                   <a:srgbClr val="4A4A4A"/>
                 </a:solidFill>
@@ -41472,27 +42622,16 @@
           </a:p>
           <a:p>
             <a:r>
-              <a:rPr lang="en-US" altLang="zh-CN" sz="1200" dirty="0">
+              <a:rPr lang="en-US" altLang="zh-CN" sz="1800" dirty="0">
                 <a:solidFill>
                   <a:srgbClr val="4A4A4A"/>
                 </a:solidFill>
                 <a:latin typeface="ITC Officina Sans Std Book" panose="020B0506040203020204" pitchFamily="34" charset="0"/>
               </a:rPr>
-              <a:t>Vs. </a:t>
-            </a:r>
-          </a:p>
-          <a:p>
-            <a:r>
-              <a:rPr lang="en-US" altLang="zh-CN" sz="1200" dirty="0">
-                <a:solidFill>
-                  <a:srgbClr val="4A4A4A"/>
-                </a:solidFill>
-                <a:latin typeface="ITC Officina Sans Std Book" panose="020B0506040203020204" pitchFamily="34" charset="0"/>
-              </a:rPr>
-              <a:t>4</a:t>
+              <a:t>Vs. 4</a:t>
             </a:r>
             <a:r>
-              <a:rPr lang="en-US" altLang="zh-CN" sz="1200" baseline="30000" dirty="0">
+              <a:rPr lang="en-US" altLang="zh-CN" sz="1800" baseline="30000" dirty="0">
                 <a:solidFill>
                   <a:srgbClr val="4A4A4A"/>
                 </a:solidFill>
@@ -41501,7 +42640,7 @@
               <a:t>th </a:t>
             </a:r>
             <a:r>
-              <a:rPr lang="en-US" altLang="zh-CN" sz="1200" dirty="0">
+              <a:rPr lang="en-US" altLang="zh-CN" sz="1800" dirty="0">
                 <a:solidFill>
                   <a:srgbClr val="4A4A4A"/>
                 </a:solidFill>
@@ -41510,7 +42649,7 @@
               <a:t>grader math advanced US / Total 4</a:t>
             </a:r>
             <a:r>
-              <a:rPr lang="en-US" altLang="zh-CN" sz="1200" baseline="30000" dirty="0">
+              <a:rPr lang="en-US" altLang="zh-CN" sz="1800" baseline="30000" dirty="0">
                 <a:solidFill>
                   <a:srgbClr val="4A4A4A"/>
                 </a:solidFill>
@@ -41519,7 +42658,7 @@
               <a:t>th </a:t>
             </a:r>
             <a:r>
-              <a:rPr lang="en-US" altLang="zh-CN" sz="1200" dirty="0">
+              <a:rPr lang="en-US" altLang="zh-CN" sz="1800" dirty="0">
                 <a:solidFill>
                   <a:srgbClr val="4A4A4A"/>
                 </a:solidFill>
@@ -41527,6 +42666,20 @@
               </a:rPr>
               <a:t>grader US</a:t>
             </a:r>
+            <a:endParaRPr lang="en-US" altLang="zh-CN" dirty="0">
+              <a:solidFill>
+                <a:srgbClr val="4A4A4A"/>
+              </a:solidFill>
+              <a:latin typeface="ITC Officina Sans Std Book" panose="020B0506040203020204" pitchFamily="34" charset="0"/>
+            </a:endParaRPr>
+          </a:p>
+          <a:p>
+            <a:endParaRPr lang="zh-CN" altLang="en-US" dirty="0">
+              <a:solidFill>
+                <a:srgbClr val="4A4A4A"/>
+              </a:solidFill>
+              <a:latin typeface="ITC Officina Sans Std Book" panose="020B0506040203020204" pitchFamily="34" charset="0"/>
+            </a:endParaRPr>
           </a:p>
         </p:txBody>
       </p:sp>
@@ -41543,14 +42696,14 @@
           <p:nvPr>
             <p:extLst>
               <p:ext uri="{D42A27DB-BD31-4B8C-83A1-F6EECF244321}">
-                <p14:modId xmlns:p14="http://schemas.microsoft.com/office/powerpoint/2010/main" val="3164692168"/>
+                <p14:modId xmlns:p14="http://schemas.microsoft.com/office/powerpoint/2010/main" val="3368905938"/>
               </p:ext>
             </p:extLst>
           </p:nvPr>
         </p:nvGraphicFramePr>
         <p:xfrm>
-          <a:off x="4328160" y="1789099"/>
-          <a:ext cx="5473701" cy="3649134"/>
+          <a:off x="5121261" y="2199646"/>
+          <a:ext cx="6094135" cy="4201154"/>
         </p:xfrm>
         <a:graphic>
           <a:graphicData uri="http://schemas.openxmlformats.org/drawingml/2006/chart">
@@ -41558,6 +42711,174 @@
           </a:graphicData>
         </a:graphic>
       </p:graphicFrame>
+      <p:sp>
+        <p:nvSpPr>
+          <p:cNvPr id="7" name="TextBox 6">
+            <a:extLst>
+              <a:ext uri="{FF2B5EF4-FFF2-40B4-BE49-F238E27FC236}">
+                <a16:creationId xmlns:a16="http://schemas.microsoft.com/office/drawing/2014/main" id="{D661DC72-C813-62D4-6A71-824D5AE965AF}"/>
+              </a:ext>
+            </a:extLst>
+          </p:cNvPr>
+          <p:cNvSpPr txBox="1"/>
+          <p:nvPr/>
+        </p:nvSpPr>
+        <p:spPr>
+          <a:xfrm>
+            <a:off x="581025" y="2190749"/>
+            <a:ext cx="3714750" cy="3046988"/>
+          </a:xfrm>
+          <a:prstGeom prst="rect">
+            <a:avLst/>
+          </a:prstGeom>
+          <a:noFill/>
+        </p:spPr>
+        <p:txBody>
+          <a:bodyPr wrap="square" rtlCol="0">
+            <a:spAutoFit/>
+          </a:bodyPr>
+          <a:lstStyle/>
+          <a:p>
+            <a:r>
+              <a:rPr lang="en-US" altLang="zh-CN" sz="1200" b="1" u="sng" dirty="0">
+                <a:solidFill>
+                  <a:srgbClr val="4A4A4A"/>
+                </a:solidFill>
+                <a:latin typeface="ITC Officina Sans Std Book" panose="020B0506040203020204" pitchFamily="34" charset="0"/>
+              </a:rPr>
+              <a:t>What does the data tell?</a:t>
+            </a:r>
+          </a:p>
+          <a:p>
+            <a:endParaRPr lang="en-US" altLang="zh-CN" sz="1200" b="1" u="sng" dirty="0">
+              <a:solidFill>
+                <a:srgbClr val="4A4A4A"/>
+              </a:solidFill>
+              <a:latin typeface="ITC Officina Sans Std Book" panose="020B0506040203020204" pitchFamily="34" charset="0"/>
+            </a:endParaRPr>
+          </a:p>
+          <a:p>
+            <a:pPr marL="171450" indent="-171450">
+              <a:buFont typeface="Arial" panose="020B0604020202020204" pitchFamily="34" charset="0"/>
+              <a:buChar char="•"/>
+            </a:pPr>
+            <a:r>
+              <a:rPr lang="en-US" altLang="zh-CN" sz="1200" dirty="0">
+                <a:solidFill>
+                  <a:srgbClr val="4A4A4A"/>
+                </a:solidFill>
+                <a:latin typeface="ITC Officina Sans Std Book" panose="020B0506040203020204" pitchFamily="34" charset="0"/>
+              </a:rPr>
+              <a:t>In CPS 4</a:t>
+            </a:r>
+            <a:r>
+              <a:rPr lang="en-US" altLang="zh-CN" sz="1200" baseline="30000" dirty="0">
+                <a:solidFill>
+                  <a:srgbClr val="4A4A4A"/>
+                </a:solidFill>
+                <a:latin typeface="ITC Officina Sans Std Book" panose="020B0506040203020204" pitchFamily="34" charset="0"/>
+              </a:rPr>
+              <a:t>th</a:t>
+            </a:r>
+            <a:r>
+              <a:rPr lang="en-US" altLang="zh-CN" sz="1200" dirty="0">
+                <a:solidFill>
+                  <a:srgbClr val="4A4A4A"/>
+                </a:solidFill>
+                <a:latin typeface="ITC Officina Sans Std Book" panose="020B0506040203020204" pitchFamily="34" charset="0"/>
+              </a:rPr>
+              <a:t> grade, Asian have the highest proportion of students who excel at math. The proportion is 1.6 times higher than White, 8 times higher than Hispanics, and 16 times higher than black. </a:t>
+            </a:r>
+          </a:p>
+          <a:p>
+            <a:pPr marL="171450" indent="-171450">
+              <a:buFont typeface="Arial" panose="020B0604020202020204" pitchFamily="34" charset="0"/>
+              <a:buChar char="•"/>
+            </a:pPr>
+            <a:endParaRPr lang="en-US" altLang="zh-CN" sz="1200" dirty="0">
+              <a:solidFill>
+                <a:srgbClr val="4A4A4A"/>
+              </a:solidFill>
+              <a:latin typeface="ITC Officina Sans Std Book" panose="020B0506040203020204" pitchFamily="34" charset="0"/>
+            </a:endParaRPr>
+          </a:p>
+          <a:p>
+            <a:pPr marL="171450" indent="-171450">
+              <a:buFont typeface="Arial" panose="020B0604020202020204" pitchFamily="34" charset="0"/>
+              <a:buChar char="•"/>
+            </a:pPr>
+            <a:r>
+              <a:rPr lang="en-US" altLang="zh-CN" sz="1200" dirty="0">
+                <a:solidFill>
+                  <a:srgbClr val="4A4A4A"/>
+                </a:solidFill>
+                <a:latin typeface="ITC Officina Sans Std Book" panose="020B0506040203020204" pitchFamily="34" charset="0"/>
+              </a:rPr>
+              <a:t>The proportion of 4</a:t>
+            </a:r>
+            <a:r>
+              <a:rPr lang="en-US" altLang="zh-CN" sz="1200" baseline="30000" dirty="0">
+                <a:solidFill>
+                  <a:srgbClr val="4A4A4A"/>
+                </a:solidFill>
+                <a:latin typeface="ITC Officina Sans Std Book" panose="020B0506040203020204" pitchFamily="34" charset="0"/>
+              </a:rPr>
+              <a:t>th</a:t>
+            </a:r>
+            <a:r>
+              <a:rPr lang="en-US" altLang="zh-CN" sz="1200" dirty="0">
+                <a:solidFill>
+                  <a:srgbClr val="4A4A4A"/>
+                </a:solidFill>
+                <a:latin typeface="ITC Officina Sans Std Book" panose="020B0506040203020204" pitchFamily="34" charset="0"/>
+              </a:rPr>
+              <a:t> graders who excelled at math is slightly higher in CPS than the national average across all ethnic groups. </a:t>
+            </a:r>
+          </a:p>
+          <a:p>
+            <a:endParaRPr lang="en-US" altLang="zh-CN" sz="1200" dirty="0">
+              <a:solidFill>
+                <a:srgbClr val="4A4A4A"/>
+              </a:solidFill>
+              <a:latin typeface="ITC Officina Sans Std Book" panose="020B0506040203020204" pitchFamily="34" charset="0"/>
+            </a:endParaRPr>
+          </a:p>
+          <a:p>
+            <a:r>
+              <a:rPr lang="en-US" altLang="zh-CN" sz="1200" b="1" u="sng" dirty="0">
+                <a:solidFill>
+                  <a:srgbClr val="4A4A4A"/>
+                </a:solidFill>
+                <a:latin typeface="ITC Officina Sans Std Book" panose="020B0506040203020204" pitchFamily="34" charset="0"/>
+              </a:rPr>
+              <a:t>Takeaways</a:t>
+            </a:r>
+          </a:p>
+          <a:p>
+            <a:endParaRPr lang="en-US" altLang="zh-CN" sz="1200" b="1" u="sng" dirty="0">
+              <a:solidFill>
+                <a:srgbClr val="4A4A4A"/>
+              </a:solidFill>
+              <a:latin typeface="ITC Officina Sans Std Book" panose="020B0506040203020204" pitchFamily="34" charset="0"/>
+            </a:endParaRPr>
+          </a:p>
+          <a:p>
+            <a:pPr marL="171450" indent="-171450">
+              <a:buFont typeface="Arial" panose="020B0604020202020204" pitchFamily="34" charset="0"/>
+              <a:buChar char="•"/>
+            </a:pPr>
+            <a:r>
+              <a:rPr lang="en-US" altLang="zh-CN" sz="1200" dirty="0">
+                <a:solidFill>
+                  <a:srgbClr val="4A4A4A"/>
+                </a:solidFill>
+                <a:latin typeface="ITC Officina Sans Std Book" panose="020B0506040203020204" pitchFamily="34" charset="0"/>
+              </a:rPr>
+              <a:t>The gap/disparity in ethnic groups is significantly enlarged from proficient students to advanced students.</a:t>
+            </a:r>
+          </a:p>
+        </p:txBody>
+      </p:sp>
     </p:spTree>
     <p:extLst>
       <p:ext uri="{BB962C8B-B14F-4D97-AF65-F5344CB8AC3E}">
@@ -41650,7 +42971,7 @@
         <p:spPr>
           <a:xfrm>
             <a:off x="510556" y="386396"/>
-            <a:ext cx="11170886" cy="677108"/>
+            <a:ext cx="11170886" cy="1508105"/>
           </a:xfrm>
           <a:prstGeom prst="rect">
             <a:avLst/>
@@ -41718,6 +43039,108 @@
               </a:rPr>
               <a:t>The proportion of CPS 8th graders advanced in math by race/ethnicity</a:t>
             </a:r>
+          </a:p>
+          <a:p>
+            <a:endParaRPr lang="en-US" altLang="zh-CN" dirty="0">
+              <a:solidFill>
+                <a:srgbClr val="4A4A4A"/>
+              </a:solidFill>
+              <a:latin typeface="ITC Officina Sans Std Book" panose="020B0506040203020204" pitchFamily="34" charset="0"/>
+            </a:endParaRPr>
+          </a:p>
+          <a:p>
+            <a:r>
+              <a:rPr lang="en-US" altLang="zh-CN" sz="1800" dirty="0">
+                <a:solidFill>
+                  <a:srgbClr val="4A4A4A"/>
+                </a:solidFill>
+                <a:latin typeface="ITC Officina Sans Std Book" panose="020B0506040203020204" pitchFamily="34" charset="0"/>
+              </a:rPr>
+              <a:t>8</a:t>
+            </a:r>
+            <a:r>
+              <a:rPr lang="en-US" altLang="zh-CN" sz="1800" baseline="30000" dirty="0">
+                <a:solidFill>
+                  <a:srgbClr val="4A4A4A"/>
+                </a:solidFill>
+                <a:latin typeface="ITC Officina Sans Std Book" panose="020B0506040203020204" pitchFamily="34" charset="0"/>
+              </a:rPr>
+              <a:t>th </a:t>
+            </a:r>
+            <a:r>
+              <a:rPr lang="en-US" altLang="zh-CN" sz="1800" dirty="0">
+                <a:solidFill>
+                  <a:srgbClr val="4A4A4A"/>
+                </a:solidFill>
+                <a:latin typeface="ITC Officina Sans Std Book" panose="020B0506040203020204" pitchFamily="34" charset="0"/>
+              </a:rPr>
+              <a:t>grader math advanced IL / Total 8</a:t>
+            </a:r>
+            <a:r>
+              <a:rPr lang="en-US" altLang="zh-CN" sz="1800" baseline="30000" dirty="0">
+                <a:solidFill>
+                  <a:srgbClr val="4A4A4A"/>
+                </a:solidFill>
+                <a:latin typeface="ITC Officina Sans Std Book" panose="020B0506040203020204" pitchFamily="34" charset="0"/>
+              </a:rPr>
+              <a:t>th </a:t>
+            </a:r>
+            <a:r>
+              <a:rPr lang="en-US" altLang="zh-CN" sz="1800" dirty="0">
+                <a:solidFill>
+                  <a:srgbClr val="4A4A4A"/>
+                </a:solidFill>
+                <a:latin typeface="ITC Officina Sans Std Book" panose="020B0506040203020204" pitchFamily="34" charset="0"/>
+              </a:rPr>
+              <a:t>grader IL</a:t>
+            </a:r>
+          </a:p>
+          <a:p>
+            <a:r>
+              <a:rPr lang="en-US" altLang="zh-CN" sz="1800" dirty="0">
+                <a:solidFill>
+                  <a:srgbClr val="4A4A4A"/>
+                </a:solidFill>
+                <a:latin typeface="ITC Officina Sans Std Book" panose="020B0506040203020204" pitchFamily="34" charset="0"/>
+              </a:rPr>
+              <a:t>Vs. 8</a:t>
+            </a:r>
+            <a:r>
+              <a:rPr lang="en-US" altLang="zh-CN" sz="1800" baseline="30000" dirty="0">
+                <a:solidFill>
+                  <a:srgbClr val="4A4A4A"/>
+                </a:solidFill>
+                <a:latin typeface="ITC Officina Sans Std Book" panose="020B0506040203020204" pitchFamily="34" charset="0"/>
+              </a:rPr>
+              <a:t>th </a:t>
+            </a:r>
+            <a:r>
+              <a:rPr lang="en-US" altLang="zh-CN" sz="1800" dirty="0">
+                <a:solidFill>
+                  <a:srgbClr val="4A4A4A"/>
+                </a:solidFill>
+                <a:latin typeface="ITC Officina Sans Std Book" panose="020B0506040203020204" pitchFamily="34" charset="0"/>
+              </a:rPr>
+              <a:t>grader math advanced US / Total 8</a:t>
+            </a:r>
+            <a:r>
+              <a:rPr lang="en-US" altLang="zh-CN" sz="1800" baseline="30000" dirty="0">
+                <a:solidFill>
+                  <a:srgbClr val="4A4A4A"/>
+                </a:solidFill>
+                <a:latin typeface="ITC Officina Sans Std Book" panose="020B0506040203020204" pitchFamily="34" charset="0"/>
+              </a:rPr>
+              <a:t>th </a:t>
+            </a:r>
+            <a:r>
+              <a:rPr lang="en-US" altLang="zh-CN" sz="1800" dirty="0">
+                <a:solidFill>
+                  <a:srgbClr val="4A4A4A"/>
+                </a:solidFill>
+                <a:latin typeface="ITC Officina Sans Std Book" panose="020B0506040203020204" pitchFamily="34" charset="0"/>
+              </a:rPr>
+              <a:t>grader US</a:t>
+            </a:r>
             <a:endParaRPr lang="zh-CN" altLang="en-US" dirty="0">
               <a:solidFill>
                 <a:srgbClr val="4A4A4A"/>
@@ -41740,14 +43163,14 @@
           <p:nvPr>
             <p:extLst>
               <p:ext uri="{D42A27DB-BD31-4B8C-83A1-F6EECF244321}">
-                <p14:modId xmlns:p14="http://schemas.microsoft.com/office/powerpoint/2010/main" val="1054932136"/>
+                <p14:modId xmlns:p14="http://schemas.microsoft.com/office/powerpoint/2010/main" val="2033237531"/>
               </p:ext>
             </p:extLst>
           </p:nvPr>
         </p:nvGraphicFramePr>
         <p:xfrm>
-          <a:off x="3911600" y="1929321"/>
-          <a:ext cx="6339840" cy="3780599"/>
+          <a:off x="5110482" y="2199908"/>
+          <a:ext cx="6123575" cy="4200892"/>
         </p:xfrm>
         <a:graphic>
           <a:graphicData uri="http://schemas.openxmlformats.org/drawingml/2006/chart">
@@ -41757,10 +43180,10 @@
       </p:graphicFrame>
       <p:sp>
         <p:nvSpPr>
-          <p:cNvPr id="8" name="TextBox 7">
+          <p:cNvPr id="6" name="TextBox 5">
             <a:extLst>
               <a:ext uri="{FF2B5EF4-FFF2-40B4-BE49-F238E27FC236}">
-                <a16:creationId xmlns:a16="http://schemas.microsoft.com/office/drawing/2014/main" id="{2857EF28-3480-26E0-FB7C-09D6E3EB269E}"/>
+                <a16:creationId xmlns:a16="http://schemas.microsoft.com/office/drawing/2014/main" id="{5443AC60-F62C-717E-6400-5BCA9B556DC2}"/>
               </a:ext>
             </a:extLst>
           </p:cNvPr>
@@ -41769,8 +43192,8 @@
         </p:nvSpPr>
         <p:spPr>
           <a:xfrm>
-            <a:off x="510556" y="2967335"/>
-            <a:ext cx="3401044" cy="646331"/>
+            <a:off x="581025" y="2190749"/>
+            <a:ext cx="3714750" cy="3231654"/>
           </a:xfrm>
           <a:prstGeom prst="rect">
             <a:avLst/>
@@ -41784,13 +43207,36 @@
           <a:lstStyle/>
           <a:p>
             <a:r>
+              <a:rPr lang="en-US" altLang="zh-CN" sz="1200" b="1" u="sng" dirty="0">
+                <a:solidFill>
+                  <a:srgbClr val="4A4A4A"/>
+                </a:solidFill>
+                <a:latin typeface="ITC Officina Sans Std Book" panose="020B0506040203020204" pitchFamily="34" charset="0"/>
+              </a:rPr>
+              <a:t>What does the data tell?</a:t>
+            </a:r>
+          </a:p>
+          <a:p>
+            <a:endParaRPr lang="en-US" altLang="zh-CN" sz="1200" b="1" u="sng" dirty="0">
+              <a:solidFill>
+                <a:srgbClr val="4A4A4A"/>
+              </a:solidFill>
+              <a:latin typeface="ITC Officina Sans Std Book" panose="020B0506040203020204" pitchFamily="34" charset="0"/>
+            </a:endParaRPr>
+          </a:p>
+          <a:p>
+            <a:pPr marL="171450" indent="-171450">
+              <a:buFont typeface="Arial" panose="020B0604020202020204" pitchFamily="34" charset="0"/>
+              <a:buChar char="•"/>
+            </a:pPr>
+            <a:r>
               <a:rPr lang="en-US" altLang="zh-CN" sz="1200" dirty="0">
                 <a:solidFill>
                   <a:srgbClr val="4A4A4A"/>
                 </a:solidFill>
                 <a:latin typeface="ITC Officina Sans Std Book" panose="020B0506040203020204" pitchFamily="34" charset="0"/>
               </a:rPr>
-              <a:t>8</a:t>
+              <a:t>In CPS 8</a:t>
             </a:r>
             <a:r>
               <a:rPr lang="en-US" altLang="zh-CN" sz="1200" baseline="30000" dirty="0">
@@ -41799,7 +43245,7 @@
                 </a:solidFill>
                 <a:latin typeface="ITC Officina Sans Std Book" panose="020B0506040203020204" pitchFamily="34" charset="0"/>
               </a:rPr>
-              <a:t>th </a:t>
+              <a:t>th</a:t>
             </a:r>
             <a:r>
               <a:rPr lang="en-US" altLang="zh-CN" sz="1200" dirty="0">
@@ -41808,7 +43254,34 @@
                 </a:solidFill>
                 <a:latin typeface="ITC Officina Sans Std Book" panose="020B0506040203020204" pitchFamily="34" charset="0"/>
               </a:rPr>
-              <a:t>grader math advanced IL / Total 8</a:t>
+              <a:t> grade, Asian have the highest proportion of students who excel at math. The proportion is 1.7 times higher than White, 6 times higher than Hispanics, and 19 times higher than black. </a:t>
+            </a:r>
+          </a:p>
+          <a:p>
+            <a:pPr marL="171450" indent="-171450">
+              <a:buFont typeface="Arial" panose="020B0604020202020204" pitchFamily="34" charset="0"/>
+              <a:buChar char="•"/>
+            </a:pPr>
+            <a:endParaRPr lang="en-US" altLang="zh-CN" sz="1200" dirty="0">
+              <a:solidFill>
+                <a:srgbClr val="4A4A4A"/>
+              </a:solidFill>
+              <a:latin typeface="ITC Officina Sans Std Book" panose="020B0506040203020204" pitchFamily="34" charset="0"/>
+            </a:endParaRPr>
+          </a:p>
+          <a:p>
+            <a:pPr marL="171450" indent="-171450">
+              <a:buFont typeface="Arial" panose="020B0604020202020204" pitchFamily="34" charset="0"/>
+              <a:buChar char="•"/>
+            </a:pPr>
+            <a:r>
+              <a:rPr lang="en-US" altLang="zh-CN" sz="1200" dirty="0">
+                <a:solidFill>
+                  <a:srgbClr val="4A4A4A"/>
+                </a:solidFill>
+                <a:latin typeface="ITC Officina Sans Std Book" panose="020B0506040203020204" pitchFamily="34" charset="0"/>
+              </a:rPr>
+              <a:t>The proportion of 8</a:t>
             </a:r>
             <a:r>
               <a:rPr lang="en-US" altLang="zh-CN" sz="1200" baseline="30000" dirty="0">
@@ -41817,7 +43290,7 @@
                 </a:solidFill>
                 <a:latin typeface="ITC Officina Sans Std Book" panose="020B0506040203020204" pitchFamily="34" charset="0"/>
               </a:rPr>
-              <a:t>th </a:t>
+              <a:t>th</a:t>
             </a:r>
             <a:r>
               <a:rPr lang="en-US" altLang="zh-CN" sz="1200" dirty="0">
@@ -41826,10 +43299,41 @@
                 </a:solidFill>
                 <a:latin typeface="ITC Officina Sans Std Book" panose="020B0506040203020204" pitchFamily="34" charset="0"/>
               </a:rPr>
-              <a:t>grader IL</a:t>
+              <a:t> graders who excelled at math is slightly higher in CPS than the national average across all ethnic groups. </a:t>
             </a:r>
           </a:p>
           <a:p>
+            <a:endParaRPr lang="en-US" altLang="zh-CN" sz="1200" dirty="0">
+              <a:solidFill>
+                <a:srgbClr val="4A4A4A"/>
+              </a:solidFill>
+              <a:latin typeface="ITC Officina Sans Std Book" panose="020B0506040203020204" pitchFamily="34" charset="0"/>
+            </a:endParaRPr>
+          </a:p>
+          <a:p>
+            <a:r>
+              <a:rPr lang="en-US" altLang="zh-CN" sz="1200" b="1" u="sng" dirty="0">
+                <a:solidFill>
+                  <a:srgbClr val="4A4A4A"/>
+                </a:solidFill>
+                <a:latin typeface="ITC Officina Sans Std Book" panose="020B0506040203020204" pitchFamily="34" charset="0"/>
+              </a:rPr>
+              <a:t>Takeaways</a:t>
+            </a:r>
+          </a:p>
+          <a:p>
+            <a:endParaRPr lang="en-US" altLang="zh-CN" sz="1200" b="1" u="sng" dirty="0">
+              <a:solidFill>
+                <a:srgbClr val="4A4A4A"/>
+              </a:solidFill>
+              <a:latin typeface="ITC Officina Sans Std Book" panose="020B0506040203020204" pitchFamily="34" charset="0"/>
+            </a:endParaRPr>
+          </a:p>
+          <a:p>
+            <a:pPr marL="171450" indent="-171450">
+              <a:buFont typeface="Arial" panose="020B0604020202020204" pitchFamily="34" charset="0"/>
+              <a:buChar char="•"/>
+            </a:pPr>
             <a:r>
               <a:rPr lang="en-US" altLang="zh-CN" sz="1200" dirty="0">
                 <a:solidFill>
@@ -41837,18 +43341,7 @@
                 </a:solidFill>
                 <a:latin typeface="ITC Officina Sans Std Book" panose="020B0506040203020204" pitchFamily="34" charset="0"/>
               </a:rPr>
-              <a:t>Vs. </a:t>
-            </a:r>
-          </a:p>
-          <a:p>
-            <a:r>
-              <a:rPr lang="en-US" altLang="zh-CN" sz="1200" dirty="0">
-                <a:solidFill>
-                  <a:srgbClr val="4A4A4A"/>
-                </a:solidFill>
-                <a:latin typeface="ITC Officina Sans Std Book" panose="020B0506040203020204" pitchFamily="34" charset="0"/>
-              </a:rPr>
-              <a:t>8</a:t>
+              <a:t>The proportion of Hispanic students who excelled at math has increased by 50% from 4</a:t>
             </a:r>
             <a:r>
               <a:rPr lang="en-US" altLang="zh-CN" sz="1200" baseline="30000" dirty="0">
@@ -41857,7 +43350,7 @@
                 </a:solidFill>
                 <a:latin typeface="ITC Officina Sans Std Book" panose="020B0506040203020204" pitchFamily="34" charset="0"/>
               </a:rPr>
-              <a:t>th </a:t>
+              <a:t>th</a:t>
             </a:r>
             <a:r>
               <a:rPr lang="en-US" altLang="zh-CN" sz="1200" dirty="0">
@@ -41866,7 +43359,7 @@
                 </a:solidFill>
                 <a:latin typeface="ITC Officina Sans Std Book" panose="020B0506040203020204" pitchFamily="34" charset="0"/>
               </a:rPr>
-              <a:t>grader math advanced US / Total 8</a:t>
+              <a:t> to 8</a:t>
             </a:r>
             <a:r>
               <a:rPr lang="en-US" altLang="zh-CN" sz="1200" baseline="30000" dirty="0">
@@ -41875,7 +43368,7 @@
                 </a:solidFill>
                 <a:latin typeface="ITC Officina Sans Std Book" panose="020B0506040203020204" pitchFamily="34" charset="0"/>
               </a:rPr>
-              <a:t>th </a:t>
+              <a:t>th</a:t>
             </a:r>
             <a:r>
               <a:rPr lang="en-US" altLang="zh-CN" sz="1200" dirty="0">
@@ -41884,7 +43377,7 @@
                 </a:solidFill>
                 <a:latin typeface="ITC Officina Sans Std Book" panose="020B0506040203020204" pitchFamily="34" charset="0"/>
               </a:rPr>
-              <a:t>grader US</a:t>
+              <a:t> grade. This increment in population is 2.8 times greater than the increment of the other three ethnic groups combined.</a:t>
             </a:r>
           </a:p>
         </p:txBody>
@@ -41981,7 +43474,7 @@
         <p:spPr>
           <a:xfrm>
             <a:off x="510556" y="386396"/>
-            <a:ext cx="11170886" cy="677108"/>
+            <a:ext cx="11170886" cy="1231106"/>
           </a:xfrm>
           <a:prstGeom prst="rect">
             <a:avLst/>
@@ -42027,45 +43520,18 @@
               </a:rPr>
               <a:t>The proportion of CPS K-8 students enrolled in a STEM magnet school by race/ethnicity</a:t>
             </a:r>
-            <a:endParaRPr lang="zh-CN" altLang="en-US" dirty="0">
+          </a:p>
+          <a:p>
+            <a:endParaRPr lang="en-US" altLang="zh-CN" dirty="0">
               <a:solidFill>
                 <a:srgbClr val="4A4A4A"/>
               </a:solidFill>
               <a:latin typeface="ITC Officina Sans Std Book" panose="020B0506040203020204" pitchFamily="34" charset="0"/>
             </a:endParaRPr>
           </a:p>
-        </p:txBody>
-      </p:sp>
-      <p:sp>
-        <p:nvSpPr>
-          <p:cNvPr id="12" name="TextBox 11">
-            <a:extLst>
-              <a:ext uri="{FF2B5EF4-FFF2-40B4-BE49-F238E27FC236}">
-                <a16:creationId xmlns:a16="http://schemas.microsoft.com/office/drawing/2014/main" id="{9C6672FC-7502-04F6-E4D2-9B68357344AE}"/>
-              </a:ext>
-            </a:extLst>
-          </p:cNvPr>
-          <p:cNvSpPr txBox="1"/>
-          <p:nvPr/>
-        </p:nvSpPr>
-        <p:spPr>
-          <a:xfrm>
-            <a:off x="510556" y="2967335"/>
-            <a:ext cx="3401044" cy="276999"/>
-          </a:xfrm>
-          <a:prstGeom prst="rect">
-            <a:avLst/>
-          </a:prstGeom>
-          <a:noFill/>
-        </p:spPr>
-        <p:txBody>
-          <a:bodyPr wrap="square" rtlCol="0">
-            <a:spAutoFit/>
-          </a:bodyPr>
-          <a:lstStyle/>
           <a:p>
             <a:r>
-              <a:rPr lang="en-US" altLang="zh-CN" sz="1200" dirty="0">
+              <a:rPr lang="en-US" altLang="zh-CN" sz="1800" dirty="0">
                 <a:solidFill>
                   <a:srgbClr val="4A4A4A"/>
                 </a:solidFill>
@@ -42089,14 +43555,14 @@
           <p:nvPr>
             <p:extLst>
               <p:ext uri="{D42A27DB-BD31-4B8C-83A1-F6EECF244321}">
-                <p14:modId xmlns:p14="http://schemas.microsoft.com/office/powerpoint/2010/main" val="3936006366"/>
+                <p14:modId xmlns:p14="http://schemas.microsoft.com/office/powerpoint/2010/main" val="4040185891"/>
               </p:ext>
             </p:extLst>
           </p:nvPr>
         </p:nvGraphicFramePr>
         <p:xfrm>
-          <a:off x="3506107" y="1465943"/>
-          <a:ext cx="6784522" cy="4194628"/>
+          <a:off x="5106307" y="2190749"/>
+          <a:ext cx="6142718" cy="4219074"/>
         </p:xfrm>
         <a:graphic>
           <a:graphicData uri="http://schemas.openxmlformats.org/drawingml/2006/chart">
@@ -42104,6 +43570,111 @@
           </a:graphicData>
         </a:graphic>
       </p:graphicFrame>
+      <p:sp>
+        <p:nvSpPr>
+          <p:cNvPr id="6" name="TextBox 5">
+            <a:extLst>
+              <a:ext uri="{FF2B5EF4-FFF2-40B4-BE49-F238E27FC236}">
+                <a16:creationId xmlns:a16="http://schemas.microsoft.com/office/drawing/2014/main" id="{F10AF634-5CC6-72C9-97D9-C3D55DB383D6}"/>
+              </a:ext>
+            </a:extLst>
+          </p:cNvPr>
+          <p:cNvSpPr txBox="1"/>
+          <p:nvPr/>
+        </p:nvSpPr>
+        <p:spPr>
+          <a:xfrm>
+            <a:off x="581025" y="2190749"/>
+            <a:ext cx="3714750" cy="2123658"/>
+          </a:xfrm>
+          <a:prstGeom prst="rect">
+            <a:avLst/>
+          </a:prstGeom>
+          <a:noFill/>
+        </p:spPr>
+        <p:txBody>
+          <a:bodyPr wrap="square" rtlCol="0">
+            <a:spAutoFit/>
+          </a:bodyPr>
+          <a:lstStyle/>
+          <a:p>
+            <a:r>
+              <a:rPr lang="en-US" altLang="zh-CN" sz="1200" b="1" u="sng" dirty="0">
+                <a:solidFill>
+                  <a:srgbClr val="4A4A4A"/>
+                </a:solidFill>
+                <a:latin typeface="ITC Officina Sans Std Book" panose="020B0506040203020204" pitchFamily="34" charset="0"/>
+              </a:rPr>
+              <a:t>What does the data tell?</a:t>
+            </a:r>
+          </a:p>
+          <a:p>
+            <a:endParaRPr lang="en-US" altLang="zh-CN" sz="1200" b="1" u="sng" dirty="0">
+              <a:solidFill>
+                <a:srgbClr val="4A4A4A"/>
+              </a:solidFill>
+              <a:latin typeface="ITC Officina Sans Std Book" panose="020B0506040203020204" pitchFamily="34" charset="0"/>
+            </a:endParaRPr>
+          </a:p>
+          <a:p>
+            <a:pPr marL="171450" indent="-171450">
+              <a:buFont typeface="Arial" panose="020B0604020202020204" pitchFamily="34" charset="0"/>
+              <a:buChar char="•"/>
+            </a:pPr>
+            <a:r>
+              <a:rPr lang="en-US" altLang="zh-CN" sz="1200" dirty="0">
+                <a:solidFill>
+                  <a:srgbClr val="4A4A4A"/>
+                </a:solidFill>
+                <a:latin typeface="ITC Officina Sans Std Book" panose="020B0506040203020204" pitchFamily="34" charset="0"/>
+              </a:rPr>
+              <a:t>Asians and Black students have the highest STEM Magnet school enrollment rate relative to their population size in K-8. 1.8 times higher than Hispanics, and 2.8 times higher than white students</a:t>
+            </a:r>
+          </a:p>
+          <a:p>
+            <a:endParaRPr lang="en-US" altLang="zh-CN" sz="1200" dirty="0">
+              <a:solidFill>
+                <a:srgbClr val="4A4A4A"/>
+              </a:solidFill>
+              <a:latin typeface="ITC Officina Sans Std Book" panose="020B0506040203020204" pitchFamily="34" charset="0"/>
+            </a:endParaRPr>
+          </a:p>
+          <a:p>
+            <a:r>
+              <a:rPr lang="en-US" altLang="zh-CN" sz="1200" b="1" u="sng" dirty="0">
+                <a:solidFill>
+                  <a:srgbClr val="4A4A4A"/>
+                </a:solidFill>
+                <a:latin typeface="ITC Officina Sans Std Book" panose="020B0506040203020204" pitchFamily="34" charset="0"/>
+              </a:rPr>
+              <a:t>Takeaways</a:t>
+            </a:r>
+          </a:p>
+          <a:p>
+            <a:endParaRPr lang="en-US" altLang="zh-CN" sz="1200" b="1" u="sng" dirty="0">
+              <a:solidFill>
+                <a:srgbClr val="4A4A4A"/>
+              </a:solidFill>
+              <a:latin typeface="ITC Officina Sans Std Book" panose="020B0506040203020204" pitchFamily="34" charset="0"/>
+            </a:endParaRPr>
+          </a:p>
+          <a:p>
+            <a:pPr marL="171450" indent="-171450">
+              <a:buFont typeface="Arial" panose="020B0604020202020204" pitchFamily="34" charset="0"/>
+              <a:buChar char="•"/>
+            </a:pPr>
+            <a:r>
+              <a:rPr lang="en-US" altLang="zh-CN" sz="1200" dirty="0">
+                <a:solidFill>
+                  <a:srgbClr val="4A4A4A"/>
+                </a:solidFill>
+                <a:latin typeface="ITC Officina Sans Std Book" panose="020B0506040203020204" pitchFamily="34" charset="0"/>
+              </a:rPr>
+              <a:t>The proportion of Black students enrolled in K-8 STEM Magnet schools is twice that of Hispanic students.</a:t>
+            </a:r>
+          </a:p>
+        </p:txBody>
+      </p:sp>
     </p:spTree>
     <p:extLst>
       <p:ext uri="{BB962C8B-B14F-4D97-AF65-F5344CB8AC3E}">

</xml_diff>